<commit_message>
COMPONENTE TEORICO: sesiones 13 y 14 actualizadas
</commit_message>
<xml_diff>
--- a/Componente_Teórico_Presentaciones/Slide-Java sesión 14 semana 5_.pptx
+++ b/Componente_Teórico_Presentaciones/Slide-Java sesión 14 semana 5_.pptx
@@ -1,6 +1,6 @@
 
 <file path=ppt/presentation.xml><?xml version="1.0" encoding="utf-8"?>
-<p:presentation xmlns:a="http://schemas.openxmlformats.org/drawingml/2006/main" xmlns:r="http://schemas.openxmlformats.org/officeDocument/2006/relationships" xmlns:mc="http://schemas.openxmlformats.org/markup-compatibility/2006" xmlns:mv="urn:schemas-microsoft-com:mac:vml" xmlns:p="http://schemas.openxmlformats.org/presentationml/2006/main" xmlns:c="http://schemas.openxmlformats.org/drawingml/2006/chart" xmlns:dgm="http://schemas.openxmlformats.org/drawingml/2006/diagram" xmlns:o="urn:schemas-microsoft-com:office:office" xmlns:v="urn:schemas-microsoft-com:vml" xmlns:pvml="urn:schemas-microsoft-com:office:powerpoint" xmlns:com="http://schemas.openxmlformats.org/drawingml/2006/compatibility" xmlns:p14="http://schemas.microsoft.com/office/powerpoint/2010/main" xmlns:p15="http://schemas.microsoft.com/office/powerpoint/2012/main" xmlns:ahyp="http://schemas.microsoft.com/office/drawing/2018/hyperlinkcolor" autoCompressPictures="0" embedTrueTypeFonts="1" strictFirstAndLastChars="0" saveSubsetFonts="1">
+<p:presentation xmlns:a="http://schemas.openxmlformats.org/drawingml/2006/main" xmlns:r="http://schemas.openxmlformats.org/officeDocument/2006/relationships" xmlns:mc="http://schemas.openxmlformats.org/markup-compatibility/2006" xmlns:mv="urn:schemas-microsoft-com:mac:vml" xmlns:p="http://schemas.openxmlformats.org/presentationml/2006/main" xmlns:c="http://schemas.openxmlformats.org/drawingml/2006/chart" xmlns:dgm="http://schemas.openxmlformats.org/drawingml/2006/diagram" xmlns:o="urn:schemas-microsoft-com:office:office" xmlns:v="urn:schemas-microsoft-com:vml" xmlns:pvml="urn:schemas-microsoft-com:office:powerpoint" xmlns:com="http://schemas.openxmlformats.org/drawingml/2006/compatibility" xmlns:p14="http://schemas.microsoft.com/office/powerpoint/2010/main" xmlns:p15="http://schemas.microsoft.com/office/powerpoint/2012/main" xmlns:ahyp="http://schemas.microsoft.com/office/drawing/2018/hyperlinkcolor" autoCompressPictures="0" strictFirstAndLastChars="0" saveSubsetFonts="1">
   <p:sldMasterIdLst>
     <p:sldMasterId id="2147483661" r:id="rId4"/>
   </p:sldMasterIdLst>
@@ -22,19 +22,9 @@
     <p:sldId id="267" r:id="rId17"/>
     <p:sldId id="268" r:id="rId18"/>
     <p:sldId id="269" r:id="rId19"/>
-    <p:sldId id="270" r:id="rId20"/>
   </p:sldIdLst>
   <p:sldSz cy="5143500" cx="9144000"/>
   <p:notesSz cx="6858000" cy="9144000"/>
-  <p:embeddedFontLst>
-    <p:embeddedFont>
-      <p:font typeface="Nunito"/>
-      <p:regular r:id="rId21"/>
-      <p:bold r:id="rId22"/>
-      <p:italic r:id="rId23"/>
-      <p:boldItalic r:id="rId24"/>
-    </p:embeddedFont>
-  </p:embeddedFontLst>
   <p:defaultTextStyle>
     <a:defPPr lvl="0" marR="0" rtl="0" algn="l">
       <a:lnSpc>
@@ -973,7 +963,7 @@
   <p:cSld>
     <p:spTree>
       <p:nvGrpSpPr>
-        <p:cNvPr id="201" name="Shape 201"/>
+        <p:cNvPr id="207" name="Shape 207"/>
         <p:cNvGrpSpPr/>
         <p:nvPr/>
       </p:nvGrpSpPr>
@@ -987,7 +977,7 @@
       </p:grpSpPr>
       <p:sp>
         <p:nvSpPr>
-          <p:cNvPr id="202" name="Google Shape;202;gdbe92afe8b_0_58:notes"/>
+          <p:cNvPr id="208" name="Google Shape;208;gb83e042e2b_0_320:notes"/>
           <p:cNvSpPr txBox="1"/>
           <p:nvPr>
             <p:ph idx="1" type="body"/>
@@ -1034,7 +1024,7 @@
       </p:sp>
       <p:sp>
         <p:nvSpPr>
-          <p:cNvPr id="203" name="Google Shape;203;gdbe92afe8b_0_58:notes"/>
+          <p:cNvPr id="209" name="Google Shape;209;gb83e042e2b_0_320:notes"/>
           <p:cNvSpPr/>
           <p:nvPr>
             <p:ph idx="2" type="sldImg"/>
@@ -1090,7 +1080,7 @@
   <p:cSld>
     <p:spTree>
       <p:nvGrpSpPr>
-        <p:cNvPr id="208" name="Shape 208"/>
+        <p:cNvPr id="215" name="Shape 215"/>
         <p:cNvGrpSpPr/>
         <p:nvPr/>
       </p:nvGrpSpPr>
@@ -1104,7 +1094,7 @@
       </p:grpSpPr>
       <p:sp>
         <p:nvSpPr>
-          <p:cNvPr id="209" name="Google Shape;209;gdbe92afe8b_0_68:notes"/>
+          <p:cNvPr id="216" name="Google Shape;216;gdbe92afe8b_0_68:notes"/>
           <p:cNvSpPr txBox="1"/>
           <p:nvPr>
             <p:ph idx="1" type="body"/>
@@ -1151,7 +1141,7 @@
       </p:sp>
       <p:sp>
         <p:nvSpPr>
-          <p:cNvPr id="210" name="Google Shape;210;gdbe92afe8b_0_68:notes"/>
+          <p:cNvPr id="217" name="Google Shape;217;gdbe92afe8b_0_68:notes"/>
           <p:cNvSpPr/>
           <p:nvPr>
             <p:ph idx="2" type="sldImg"/>
@@ -1207,7 +1197,7 @@
   <p:cSld>
     <p:spTree>
       <p:nvGrpSpPr>
-        <p:cNvPr id="216" name="Shape 216"/>
+        <p:cNvPr id="222" name="Shape 222"/>
         <p:cNvGrpSpPr/>
         <p:nvPr/>
       </p:nvGrpSpPr>
@@ -1221,7 +1211,7 @@
       </p:grpSpPr>
       <p:sp>
         <p:nvSpPr>
-          <p:cNvPr id="217" name="Google Shape;217;gdbe92afe8b_0_73:notes"/>
+          <p:cNvPr id="223" name="Google Shape;223;gdbe92afe8b_0_77:notes"/>
           <p:cNvSpPr txBox="1"/>
           <p:nvPr>
             <p:ph idx="1" type="body"/>
@@ -1268,7 +1258,7 @@
       </p:sp>
       <p:sp>
         <p:nvSpPr>
-          <p:cNvPr id="218" name="Google Shape;218;gdbe92afe8b_0_73:notes"/>
+          <p:cNvPr id="224" name="Google Shape;224;gdbe92afe8b_0_77:notes"/>
           <p:cNvSpPr/>
           <p:nvPr>
             <p:ph idx="2" type="sldImg"/>
@@ -1324,7 +1314,7 @@
   <p:cSld>
     <p:spTree>
       <p:nvGrpSpPr>
-        <p:cNvPr id="223" name="Shape 223"/>
+        <p:cNvPr id="229" name="Shape 229"/>
         <p:cNvGrpSpPr/>
         <p:nvPr/>
       </p:nvGrpSpPr>
@@ -1338,7 +1328,7 @@
       </p:grpSpPr>
       <p:sp>
         <p:nvSpPr>
-          <p:cNvPr id="224" name="Google Shape;224;gdbe92afe8b_0_77:notes"/>
+          <p:cNvPr id="230" name="Google Shape;230;gdbcc408e35_0_1:notes"/>
           <p:cNvSpPr txBox="1"/>
           <p:nvPr>
             <p:ph idx="1" type="body"/>
@@ -1385,7 +1375,7 @@
       </p:sp>
       <p:sp>
         <p:nvSpPr>
-          <p:cNvPr id="225" name="Google Shape;225;gdbe92afe8b_0_77:notes"/>
+          <p:cNvPr id="231" name="Google Shape;231;gdbcc408e35_0_1:notes"/>
           <p:cNvSpPr/>
           <p:nvPr>
             <p:ph idx="2" type="sldImg"/>
@@ -1441,7 +1431,7 @@
   <p:cSld>
     <p:spTree>
       <p:nvGrpSpPr>
-        <p:cNvPr id="230" name="Shape 230"/>
+        <p:cNvPr id="234" name="Shape 234"/>
         <p:cNvGrpSpPr/>
         <p:nvPr/>
       </p:nvGrpSpPr>
@@ -1455,124 +1445,7 @@
       </p:grpSpPr>
       <p:sp>
         <p:nvSpPr>
-          <p:cNvPr id="231" name="Google Shape;231;gdbcc408e35_0_1:notes"/>
-          <p:cNvSpPr txBox="1"/>
-          <p:nvPr>
-            <p:ph idx="1" type="body"/>
-          </p:nvPr>
-        </p:nvSpPr>
-        <p:spPr>
-          <a:xfrm>
-            <a:off x="685800" y="4343400"/>
-            <a:ext cx="5486400" cy="4114800"/>
-          </a:xfrm>
-          <a:prstGeom prst="rect">
-            <a:avLst/>
-          </a:prstGeom>
-          <a:noFill/>
-          <a:ln>
-            <a:noFill/>
-          </a:ln>
-        </p:spPr>
-        <p:txBody>
-          <a:bodyPr anchorCtr="0" anchor="t" bIns="91425" lIns="91425" spcFirstLastPara="1" rIns="91425" wrap="square" tIns="91425">
-            <a:noAutofit/>
-          </a:bodyPr>
-          <a:lstStyle/>
-          <a:p>
-            <a:pPr indent="0" lvl="0" marL="0" rtl="0" algn="l">
-              <a:lnSpc>
-                <a:spcPct val="100000"/>
-              </a:lnSpc>
-              <a:spcBef>
-                <a:spcPts val="0"/>
-              </a:spcBef>
-              <a:spcAft>
-                <a:spcPts val="0"/>
-              </a:spcAft>
-              <a:buSzPts val="1100"/>
-              <a:buNone/>
-            </a:pPr>
-            <a:r>
-              <a:t/>
-            </a:r>
-            <a:endParaRPr/>
-          </a:p>
-        </p:txBody>
-      </p:sp>
-      <p:sp>
-        <p:nvSpPr>
-          <p:cNvPr id="232" name="Google Shape;232;gdbcc408e35_0_1:notes"/>
-          <p:cNvSpPr/>
-          <p:nvPr>
-            <p:ph idx="2" type="sldImg"/>
-          </p:nvPr>
-        </p:nvSpPr>
-        <p:spPr>
-          <a:xfrm>
-            <a:off x="381000" y="685800"/>
-            <a:ext cx="6096000" cy="3429000"/>
-          </a:xfrm>
-          <a:custGeom>
-            <a:rect b="b" l="l" r="r" t="t"/>
-            <a:pathLst>
-              <a:path extrusionOk="0" h="120000" w="120000">
-                <a:moveTo>
-                  <a:pt x="0" y="0"/>
-                </a:moveTo>
-                <a:lnTo>
-                  <a:pt x="120000" y="0"/>
-                </a:lnTo>
-                <a:lnTo>
-                  <a:pt x="120000" y="120000"/>
-                </a:lnTo>
-                <a:lnTo>
-                  <a:pt x="0" y="120000"/>
-                </a:lnTo>
-                <a:close/>
-              </a:path>
-            </a:pathLst>
-          </a:custGeom>
-          <a:noFill/>
-          <a:ln cap="flat" cmpd="sng" w="9525">
-            <a:solidFill>
-              <a:srgbClr val="000000"/>
-            </a:solidFill>
-            <a:prstDash val="solid"/>
-            <a:round/>
-            <a:headEnd len="sm" w="sm" type="none"/>
-            <a:tailEnd len="sm" w="sm" type="none"/>
-          </a:ln>
-        </p:spPr>
-      </p:sp>
-    </p:spTree>
-  </p:cSld>
-  <p:clrMapOvr>
-    <a:masterClrMapping/>
-  </p:clrMapOvr>
-</p:notes>
-</file>
-
-<file path=ppt/notesSlides/notesSlide15.xml><?xml version="1.0" encoding="utf-8"?>
-<p:notes xmlns:a="http://schemas.openxmlformats.org/drawingml/2006/main" xmlns:r="http://schemas.openxmlformats.org/officeDocument/2006/relationships" xmlns:mc="http://schemas.openxmlformats.org/markup-compatibility/2006" xmlns:mv="urn:schemas-microsoft-com:mac:vml" xmlns:p="http://schemas.openxmlformats.org/presentationml/2006/main" xmlns:c="http://schemas.openxmlformats.org/drawingml/2006/chart" xmlns:dgm="http://schemas.openxmlformats.org/drawingml/2006/diagram" xmlns:o="urn:schemas-microsoft-com:office:office" xmlns:v="urn:schemas-microsoft-com:vml" xmlns:pvml="urn:schemas-microsoft-com:office:powerpoint" xmlns:com="http://schemas.openxmlformats.org/drawingml/2006/compatibility" xmlns:p14="http://schemas.microsoft.com/office/powerpoint/2010/main" xmlns:p15="http://schemas.microsoft.com/office/powerpoint/2012/main" xmlns:ahyp="http://schemas.microsoft.com/office/drawing/2018/hyperlinkcolor" showMasterPhAnim="0" showMasterSp="0">
-  <p:cSld>
-    <p:spTree>
-      <p:nvGrpSpPr>
-        <p:cNvPr id="235" name="Shape 235"/>
-        <p:cNvGrpSpPr/>
-        <p:nvPr/>
-      </p:nvGrpSpPr>
-      <p:grpSpPr>
-        <a:xfrm>
-          <a:off x="0" y="0"/>
-          <a:ext cx="0" cy="0"/>
-          <a:chOff x="0" y="0"/>
-          <a:chExt cx="0" cy="0"/>
-        </a:xfrm>
-      </p:grpSpPr>
-      <p:sp>
-        <p:nvSpPr>
-          <p:cNvPr id="236" name="Google Shape;236;gd62fcfd924_1_333:notes"/>
+          <p:cNvPr id="235" name="Google Shape;235;gd62fcfd924_1_333:notes"/>
           <p:cNvSpPr txBox="1"/>
           <p:nvPr>
             <p:ph idx="1" type="body"/>
@@ -1611,7 +1484,7 @@
       </p:sp>
       <p:sp>
         <p:nvSpPr>
-          <p:cNvPr id="237" name="Google Shape;237;gd62fcfd924_1_333:notes"/>
+          <p:cNvPr id="236" name="Google Shape;236;gd62fcfd924_1_333:notes"/>
           <p:cNvSpPr/>
           <p:nvPr>
             <p:ph idx="2" type="sldImg"/>
@@ -2008,7 +1881,7 @@
   <p:cSld>
     <p:spTree>
       <p:nvGrpSpPr>
-        <p:cNvPr id="164" name="Shape 164"/>
+        <p:cNvPr id="163" name="Shape 163"/>
         <p:cNvGrpSpPr/>
         <p:nvPr/>
       </p:nvGrpSpPr>
@@ -2022,7 +1895,7 @@
       </p:grpSpPr>
       <p:sp>
         <p:nvSpPr>
-          <p:cNvPr id="165" name="Google Shape;165;gdbe92afe8b_0_12:notes"/>
+          <p:cNvPr id="164" name="Google Shape;164;gdbe92afe8b_0_12:notes"/>
           <p:cNvSpPr txBox="1"/>
           <p:nvPr>
             <p:ph idx="1" type="body"/>
@@ -2069,7 +1942,7 @@
       </p:sp>
       <p:sp>
         <p:nvSpPr>
-          <p:cNvPr id="166" name="Google Shape;166;gdbe92afe8b_0_12:notes"/>
+          <p:cNvPr id="165" name="Google Shape;165;gdbe92afe8b_0_12:notes"/>
           <p:cNvSpPr/>
           <p:nvPr>
             <p:ph idx="2" type="sldImg"/>
@@ -2125,7 +1998,7 @@
   <p:cSld>
     <p:spTree>
       <p:nvGrpSpPr>
-        <p:cNvPr id="171" name="Shape 171"/>
+        <p:cNvPr id="170" name="Shape 170"/>
         <p:cNvGrpSpPr/>
         <p:nvPr/>
       </p:nvGrpSpPr>
@@ -2139,7 +2012,7 @@
       </p:grpSpPr>
       <p:sp>
         <p:nvSpPr>
-          <p:cNvPr id="172" name="Google Shape;172;gdbe92afe8b_0_21:notes"/>
+          <p:cNvPr id="171" name="Google Shape;171;gb83e042e2b_0_11:notes"/>
           <p:cNvSpPr txBox="1"/>
           <p:nvPr>
             <p:ph idx="1" type="body"/>
@@ -2186,7 +2059,7 @@
       </p:sp>
       <p:sp>
         <p:nvSpPr>
-          <p:cNvPr id="173" name="Google Shape;173;gdbe92afe8b_0_21:notes"/>
+          <p:cNvPr id="172" name="Google Shape;172;gb83e042e2b_0_11:notes"/>
           <p:cNvSpPr/>
           <p:nvPr>
             <p:ph idx="2" type="sldImg"/>
@@ -2256,7 +2129,7 @@
       </p:grpSpPr>
       <p:sp>
         <p:nvSpPr>
-          <p:cNvPr id="181" name="Google Shape;181;gdbe92afe8b_0_31:notes"/>
+          <p:cNvPr id="181" name="Google Shape;181;gb83e042e2b_0_159:notes"/>
           <p:cNvSpPr txBox="1"/>
           <p:nvPr>
             <p:ph idx="1" type="body"/>
@@ -2303,7 +2176,7 @@
       </p:sp>
       <p:sp>
         <p:nvSpPr>
-          <p:cNvPr id="182" name="Google Shape;182;gdbe92afe8b_0_31:notes"/>
+          <p:cNvPr id="182" name="Google Shape;182;gb83e042e2b_0_159:notes"/>
           <p:cNvSpPr/>
           <p:nvPr>
             <p:ph idx="2" type="sldImg"/>
@@ -2359,7 +2232,7 @@
   <p:cSld>
     <p:spTree>
       <p:nvGrpSpPr>
-        <p:cNvPr id="187" name="Shape 187"/>
+        <p:cNvPr id="189" name="Shape 189"/>
         <p:cNvGrpSpPr/>
         <p:nvPr/>
       </p:nvGrpSpPr>
@@ -2373,7 +2246,7 @@
       </p:grpSpPr>
       <p:sp>
         <p:nvSpPr>
-          <p:cNvPr id="188" name="Google Shape;188;gdbe92afe8b_0_50:notes"/>
+          <p:cNvPr id="190" name="Google Shape;190;gb83e042e2b_0_308:notes"/>
           <p:cNvSpPr txBox="1"/>
           <p:nvPr>
             <p:ph idx="1" type="body"/>
@@ -2420,7 +2293,7 @@
       </p:sp>
       <p:sp>
         <p:nvSpPr>
-          <p:cNvPr id="189" name="Google Shape;189;gdbe92afe8b_0_50:notes"/>
+          <p:cNvPr id="191" name="Google Shape;191;gb83e042e2b_0_308:notes"/>
           <p:cNvSpPr/>
           <p:nvPr>
             <p:ph idx="2" type="sldImg"/>
@@ -2476,7 +2349,7 @@
   <p:cSld>
     <p:spTree>
       <p:nvGrpSpPr>
-        <p:cNvPr id="194" name="Shape 194"/>
+        <p:cNvPr id="196" name="Shape 196"/>
         <p:cNvGrpSpPr/>
         <p:nvPr/>
       </p:nvGrpSpPr>
@@ -2490,7 +2363,7 @@
       </p:grpSpPr>
       <p:sp>
         <p:nvSpPr>
-          <p:cNvPr id="195" name="Google Shape;195;gdbe92afe8b_0_42:notes"/>
+          <p:cNvPr id="197" name="Google Shape;197;gdbe92afe8b_0_50:notes"/>
           <p:cNvSpPr txBox="1"/>
           <p:nvPr>
             <p:ph idx="1" type="body"/>
@@ -2537,7 +2410,7 @@
       </p:sp>
       <p:sp>
         <p:nvSpPr>
-          <p:cNvPr id="196" name="Google Shape;196;gdbe92afe8b_0_42:notes"/>
+          <p:cNvPr id="198" name="Google Shape;198;gdbe92afe8b_0_50:notes"/>
           <p:cNvSpPr/>
           <p:nvPr>
             <p:ph idx="2" type="sldImg"/>
@@ -17142,7 +17015,7 @@
     </p:bg>
     <p:spTree>
       <p:nvGrpSpPr>
-        <p:cNvPr id="204" name="Shape 204"/>
+        <p:cNvPr id="210" name="Shape 210"/>
         <p:cNvGrpSpPr/>
         <p:nvPr/>
       </p:nvGrpSpPr>
@@ -17156,7 +17029,272 @@
       </p:grpSpPr>
       <p:sp>
         <p:nvSpPr>
-          <p:cNvPr id="205" name="Google Shape;205;p24"/>
+          <p:cNvPr id="211" name="Google Shape;211;p24"/>
+          <p:cNvSpPr txBox="1"/>
+          <p:nvPr>
+            <p:ph type="title"/>
+          </p:nvPr>
+        </p:nvSpPr>
+        <p:spPr>
+          <a:xfrm>
+            <a:off x="965800" y="1055625"/>
+            <a:ext cx="7505700" cy="618000"/>
+          </a:xfrm>
+          <a:prstGeom prst="rect">
+            <a:avLst/>
+          </a:prstGeom>
+          <a:noFill/>
+          <a:ln>
+            <a:noFill/>
+          </a:ln>
+        </p:spPr>
+        <p:txBody>
+          <a:bodyPr anchorCtr="0" anchor="b" bIns="34275" lIns="68575" spcFirstLastPara="1" rIns="68575" wrap="square" tIns="34275">
+            <a:noAutofit/>
+          </a:bodyPr>
+          <a:lstStyle/>
+          <a:p>
+            <a:pPr indent="0" lvl="0" marL="0" rtl="0" algn="l">
+              <a:lnSpc>
+                <a:spcPct val="85000"/>
+              </a:lnSpc>
+              <a:spcBef>
+                <a:spcPts val="0"/>
+              </a:spcBef>
+              <a:spcAft>
+                <a:spcPts val="0"/>
+              </a:spcAft>
+              <a:buClr>
+                <a:srgbClr val="3F3F3F"/>
+              </a:buClr>
+              <a:buSzPts val="3600"/>
+              <a:buFont typeface="Calibri"/>
+              <a:buNone/>
+            </a:pPr>
+            <a:r>
+              <a:rPr lang="es" sz="2800">
+                <a:solidFill>
+                  <a:srgbClr val="E83464"/>
+                </a:solidFill>
+                <a:latin typeface="Arial"/>
+                <a:ea typeface="Arial"/>
+                <a:cs typeface="Arial"/>
+                <a:sym typeface="Arial"/>
+              </a:rPr>
+              <a:t>Código del ejemplo utilizando Scene Builder</a:t>
+            </a:r>
+            <a:r>
+              <a:rPr lang="es" sz="2600">
+                <a:solidFill>
+                  <a:srgbClr val="E83464"/>
+                </a:solidFill>
+                <a:latin typeface="Arial"/>
+                <a:ea typeface="Arial"/>
+                <a:cs typeface="Arial"/>
+                <a:sym typeface="Arial"/>
+              </a:rPr>
+              <a:t>: Calculadora</a:t>
+            </a:r>
+            <a:endParaRPr sz="2800">
+              <a:solidFill>
+                <a:srgbClr val="E83464"/>
+              </a:solidFill>
+              <a:latin typeface="Arial"/>
+              <a:ea typeface="Arial"/>
+              <a:cs typeface="Arial"/>
+              <a:sym typeface="Arial"/>
+            </a:endParaRPr>
+          </a:p>
+        </p:txBody>
+      </p:sp>
+      <p:sp>
+        <p:nvSpPr>
+          <p:cNvPr id="212" name="Google Shape;212;p24"/>
+          <p:cNvSpPr txBox="1"/>
+          <p:nvPr/>
+        </p:nvSpPr>
+        <p:spPr>
+          <a:xfrm>
+            <a:off x="5337550" y="2571750"/>
+            <a:ext cx="3267300" cy="1157100"/>
+          </a:xfrm>
+          <a:prstGeom prst="rect">
+            <a:avLst/>
+          </a:prstGeom>
+          <a:noFill/>
+          <a:ln>
+            <a:noFill/>
+          </a:ln>
+        </p:spPr>
+        <p:txBody>
+          <a:bodyPr anchorCtr="0" anchor="b" bIns="34275" lIns="68575" spcFirstLastPara="1" rIns="68575" wrap="square" tIns="34275">
+            <a:noAutofit/>
+          </a:bodyPr>
+          <a:lstStyle/>
+          <a:p>
+            <a:pPr indent="0" lvl="0" marL="0" marR="0" rtl="0" algn="l">
+              <a:lnSpc>
+                <a:spcPct val="85000"/>
+              </a:lnSpc>
+              <a:spcBef>
+                <a:spcPts val="0"/>
+              </a:spcBef>
+              <a:spcAft>
+                <a:spcPts val="0"/>
+              </a:spcAft>
+              <a:buClr>
+                <a:srgbClr val="3F3F3F"/>
+              </a:buClr>
+              <a:buSzPts val="3600"/>
+              <a:buFont typeface="Calibri"/>
+              <a:buNone/>
+            </a:pPr>
+            <a:r>
+              <a:rPr lang="es" sz="1600">
+                <a:solidFill>
+                  <a:srgbClr val="3C63AB"/>
+                </a:solidFill>
+              </a:rPr>
+              <a:t>Al presionar un botón para hacer una operación (+, -, /, *), se guarda el operando y la respectiva operación para luego calcular el total.</a:t>
+            </a:r>
+            <a:endParaRPr b="0" i="0" sz="1600" u="none" cap="none" strike="noStrike">
+              <a:solidFill>
+                <a:srgbClr val="3C63AB"/>
+              </a:solidFill>
+              <a:latin typeface="Arial"/>
+              <a:ea typeface="Arial"/>
+              <a:cs typeface="Arial"/>
+              <a:sym typeface="Arial"/>
+            </a:endParaRPr>
+          </a:p>
+        </p:txBody>
+      </p:sp>
+      <p:sp>
+        <p:nvSpPr>
+          <p:cNvPr id="213" name="Google Shape;213;p24"/>
+          <p:cNvSpPr txBox="1"/>
+          <p:nvPr/>
+        </p:nvSpPr>
+        <p:spPr>
+          <a:xfrm>
+            <a:off x="752475" y="1857975"/>
+            <a:ext cx="3448200" cy="384300"/>
+          </a:xfrm>
+          <a:prstGeom prst="rect">
+            <a:avLst/>
+          </a:prstGeom>
+          <a:noFill/>
+          <a:ln>
+            <a:noFill/>
+          </a:ln>
+        </p:spPr>
+        <p:txBody>
+          <a:bodyPr anchorCtr="0" anchor="b" bIns="34275" lIns="68575" spcFirstLastPara="1" rIns="68575" wrap="square" tIns="34275">
+            <a:noAutofit/>
+          </a:bodyPr>
+          <a:lstStyle/>
+          <a:p>
+            <a:pPr indent="0" lvl="0" marL="0" marR="0" rtl="0" algn="l">
+              <a:lnSpc>
+                <a:spcPct val="85000"/>
+              </a:lnSpc>
+              <a:spcBef>
+                <a:spcPts val="0"/>
+              </a:spcBef>
+              <a:spcAft>
+                <a:spcPts val="0"/>
+              </a:spcAft>
+              <a:buClr>
+                <a:srgbClr val="3F3F3F"/>
+              </a:buClr>
+              <a:buSzPts val="3600"/>
+              <a:buFont typeface="Calibri"/>
+              <a:buNone/>
+            </a:pPr>
+            <a:r>
+              <a:rPr b="1" lang="es" sz="1500">
+                <a:solidFill>
+                  <a:srgbClr val="3C63AB"/>
+                </a:solidFill>
+              </a:rPr>
+              <a:t>Archivo controlador</a:t>
+            </a:r>
+            <a:endParaRPr b="1" i="0" sz="1500" u="none" cap="none" strike="noStrike">
+              <a:solidFill>
+                <a:srgbClr val="3C63AB"/>
+              </a:solidFill>
+            </a:endParaRPr>
+          </a:p>
+        </p:txBody>
+      </p:sp>
+      <p:pic>
+        <p:nvPicPr>
+          <p:cNvPr id="214" name="Google Shape;214;p24"/>
+          <p:cNvPicPr preferRelativeResize="0"/>
+          <p:nvPr/>
+        </p:nvPicPr>
+        <p:blipFill>
+          <a:blip r:embed="rId4">
+            <a:alphaModFix/>
+          </a:blip>
+          <a:stretch>
+            <a:fillRect/>
+          </a:stretch>
+        </p:blipFill>
+        <p:spPr>
+          <a:xfrm>
+            <a:off x="638173" y="2426623"/>
+            <a:ext cx="4254600" cy="1447350"/>
+          </a:xfrm>
+          <a:prstGeom prst="rect">
+            <a:avLst/>
+          </a:prstGeom>
+          <a:noFill/>
+          <a:ln>
+            <a:noFill/>
+          </a:ln>
+        </p:spPr>
+      </p:pic>
+    </p:spTree>
+  </p:cSld>
+  <p:clrMapOvr>
+    <a:masterClrMapping/>
+  </p:clrMapOvr>
+</p:sld>
+</file>
+
+<file path=ppt/slides/slide11.xml><?xml version="1.0" encoding="utf-8"?>
+<p:sld xmlns:a="http://schemas.openxmlformats.org/drawingml/2006/main" xmlns:r="http://schemas.openxmlformats.org/officeDocument/2006/relationships" xmlns:mc="http://schemas.openxmlformats.org/markup-compatibility/2006" xmlns:mv="urn:schemas-microsoft-com:mac:vml" xmlns:p="http://schemas.openxmlformats.org/presentationml/2006/main" xmlns:c="http://schemas.openxmlformats.org/drawingml/2006/chart" xmlns:dgm="http://schemas.openxmlformats.org/drawingml/2006/diagram" xmlns:o="urn:schemas-microsoft-com:office:office" xmlns:v="urn:schemas-microsoft-com:vml" xmlns:pvml="urn:schemas-microsoft-com:office:powerpoint" xmlns:com="http://schemas.openxmlformats.org/drawingml/2006/compatibility" xmlns:p14="http://schemas.microsoft.com/office/powerpoint/2010/main" xmlns:p15="http://schemas.microsoft.com/office/powerpoint/2012/main" xmlns:ahyp="http://schemas.microsoft.com/office/drawing/2018/hyperlinkcolor" showMasterSp="0">
+  <p:cSld>
+    <p:bg>
+      <p:bgPr>
+        <a:blipFill>
+          <a:blip r:embed="rId3">
+            <a:alphaModFix/>
+          </a:blip>
+          <a:stretch>
+            <a:fillRect/>
+          </a:stretch>
+        </a:blipFill>
+      </p:bgPr>
+    </p:bg>
+    <p:spTree>
+      <p:nvGrpSpPr>
+        <p:cNvPr id="218" name="Shape 218"/>
+        <p:cNvGrpSpPr/>
+        <p:nvPr/>
+      </p:nvGrpSpPr>
+      <p:grpSpPr>
+        <a:xfrm>
+          <a:off x="0" y="0"/>
+          <a:ext cx="0" cy="0"/>
+          <a:chOff x="0" y="0"/>
+          <a:chExt cx="0" cy="0"/>
+        </a:xfrm>
+      </p:grpSpPr>
+      <p:sp>
+        <p:nvSpPr>
+          <p:cNvPr id="219" name="Google Shape;219;p25"/>
           <p:cNvSpPr txBox="1"/>
           <p:nvPr>
             <p:ph type="title"/>
@@ -17234,44 +17372,16 @@
           </a:p>
         </p:txBody>
       </p:sp>
-      <p:pic>
-        <p:nvPicPr>
-          <p:cNvPr id="206" name="Google Shape;206;p24"/>
-          <p:cNvPicPr preferRelativeResize="0"/>
-          <p:nvPr/>
-        </p:nvPicPr>
-        <p:blipFill>
-          <a:blip r:embed="rId4">
-            <a:alphaModFix/>
-          </a:blip>
-          <a:stretch>
-            <a:fillRect/>
-          </a:stretch>
-        </p:blipFill>
-        <p:spPr>
-          <a:xfrm>
-            <a:off x="1092450" y="1508200"/>
-            <a:ext cx="3211626" cy="3445450"/>
-          </a:xfrm>
-          <a:prstGeom prst="rect">
-            <a:avLst/>
-          </a:prstGeom>
-          <a:noFill/>
-          <a:ln>
-            <a:noFill/>
-          </a:ln>
-        </p:spPr>
-      </p:pic>
       <p:sp>
         <p:nvSpPr>
-          <p:cNvPr id="207" name="Google Shape;207;p24"/>
+          <p:cNvPr id="220" name="Google Shape;220;p25"/>
           <p:cNvSpPr txBox="1"/>
           <p:nvPr/>
         </p:nvSpPr>
         <p:spPr>
           <a:xfrm>
-            <a:off x="4949525" y="2225525"/>
-            <a:ext cx="2894400" cy="1030200"/>
+            <a:off x="5049275" y="2171700"/>
+            <a:ext cx="2894400" cy="1411200"/>
           </a:xfrm>
           <a:prstGeom prst="rect">
             <a:avLst/>
@@ -17310,23 +17420,7 @@
                   <a:srgbClr val="3C63AB"/>
                 </a:solidFill>
               </a:rPr>
-              <a:t>Validación</a:t>
-            </a:r>
-            <a:r>
-              <a:rPr lang="es" sz="1700">
-                <a:solidFill>
-                  <a:srgbClr val="3C63AB"/>
-                </a:solidFill>
-              </a:rPr>
-              <a:t> del evento entrante para hacer la respectiva </a:t>
-            </a:r>
-            <a:r>
-              <a:rPr lang="es" sz="1700">
-                <a:solidFill>
-                  <a:srgbClr val="3C63AB"/>
-                </a:solidFill>
-              </a:rPr>
-              <a:t>operación</a:t>
+              <a:t>Calcular el resultado total dependiendo de los valores guardados previamente y mostrar el valor en pantalla.</a:t>
             </a:r>
             <a:endParaRPr b="0" i="0" sz="1700" u="none" cap="none" strike="noStrike">
               <a:solidFill>
@@ -17340,6 +17434,34 @@
           </a:p>
         </p:txBody>
       </p:sp>
+      <p:pic>
+        <p:nvPicPr>
+          <p:cNvPr id="221" name="Google Shape;221;p25"/>
+          <p:cNvPicPr preferRelativeResize="0"/>
+          <p:nvPr/>
+        </p:nvPicPr>
+        <p:blipFill>
+          <a:blip r:embed="rId4">
+            <a:alphaModFix/>
+          </a:blip>
+          <a:stretch>
+            <a:fillRect/>
+          </a:stretch>
+        </p:blipFill>
+        <p:spPr>
+          <a:xfrm>
+            <a:off x="811800" y="1526925"/>
+            <a:ext cx="3760188" cy="3416551"/>
+          </a:xfrm>
+          <a:prstGeom prst="rect">
+            <a:avLst/>
+          </a:prstGeom>
+          <a:noFill/>
+          <a:ln>
+            <a:noFill/>
+          </a:ln>
+        </p:spPr>
+      </p:pic>
     </p:spTree>
   </p:cSld>
   <p:clrMapOvr>
@@ -17348,7 +17470,7 @@
 </p:sld>
 </file>
 
-<file path=ppt/slides/slide11.xml><?xml version="1.0" encoding="utf-8"?>
+<file path=ppt/slides/slide12.xml><?xml version="1.0" encoding="utf-8"?>
 <p:sld xmlns:a="http://schemas.openxmlformats.org/drawingml/2006/main" xmlns:r="http://schemas.openxmlformats.org/officeDocument/2006/relationships" xmlns:mc="http://schemas.openxmlformats.org/markup-compatibility/2006" xmlns:mv="urn:schemas-microsoft-com:mac:vml" xmlns:p="http://schemas.openxmlformats.org/presentationml/2006/main" xmlns:c="http://schemas.openxmlformats.org/drawingml/2006/chart" xmlns:dgm="http://schemas.openxmlformats.org/drawingml/2006/diagram" xmlns:o="urn:schemas-microsoft-com:office:office" xmlns:v="urn:schemas-microsoft-com:vml" xmlns:pvml="urn:schemas-microsoft-com:office:powerpoint" xmlns:com="http://schemas.openxmlformats.org/drawingml/2006/compatibility" xmlns:p14="http://schemas.microsoft.com/office/powerpoint/2010/main" xmlns:p15="http://schemas.microsoft.com/office/powerpoint/2012/main" xmlns:ahyp="http://schemas.microsoft.com/office/drawing/2018/hyperlinkcolor" showMasterSp="0">
   <p:cSld>
     <p:bg>
@@ -17365,7 +17487,7 @@
     </p:bg>
     <p:spTree>
       <p:nvGrpSpPr>
-        <p:cNvPr id="211" name="Shape 211"/>
+        <p:cNvPr id="225" name="Shape 225"/>
         <p:cNvGrpSpPr/>
         <p:nvPr/>
       </p:nvGrpSpPr>
@@ -17379,7 +17501,7 @@
       </p:grpSpPr>
       <p:sp>
         <p:nvSpPr>
-          <p:cNvPr id="212" name="Google Shape;212;p25"/>
+          <p:cNvPr id="226" name="Google Shape;226;p26"/>
           <p:cNvSpPr txBox="1"/>
           <p:nvPr>
             <p:ph type="title"/>
@@ -17457,72 +17579,16 @@
           </a:p>
         </p:txBody>
       </p:sp>
-      <p:pic>
-        <p:nvPicPr>
-          <p:cNvPr id="213" name="Google Shape;213;p25"/>
-          <p:cNvPicPr preferRelativeResize="0"/>
-          <p:nvPr/>
-        </p:nvPicPr>
-        <p:blipFill>
-          <a:blip r:embed="rId4">
-            <a:alphaModFix/>
-          </a:blip>
-          <a:stretch>
-            <a:fillRect/>
-          </a:stretch>
-        </p:blipFill>
-        <p:spPr>
-          <a:xfrm>
-            <a:off x="805650" y="1564475"/>
-            <a:ext cx="2742050" cy="3343650"/>
-          </a:xfrm>
-          <a:prstGeom prst="rect">
-            <a:avLst/>
-          </a:prstGeom>
-          <a:noFill/>
-          <a:ln>
-            <a:noFill/>
-          </a:ln>
-        </p:spPr>
-      </p:pic>
-      <p:pic>
-        <p:nvPicPr>
-          <p:cNvPr id="214" name="Google Shape;214;p25"/>
-          <p:cNvPicPr preferRelativeResize="0"/>
-          <p:nvPr/>
-        </p:nvPicPr>
-        <p:blipFill>
-          <a:blip r:embed="rId5">
-            <a:alphaModFix/>
-          </a:blip>
-          <a:stretch>
-            <a:fillRect/>
-          </a:stretch>
-        </p:blipFill>
-        <p:spPr>
-          <a:xfrm>
-            <a:off x="4899100" y="1564475"/>
-            <a:ext cx="3390350" cy="1402900"/>
-          </a:xfrm>
-          <a:prstGeom prst="rect">
-            <a:avLst/>
-          </a:prstGeom>
-          <a:noFill/>
-          <a:ln>
-            <a:noFill/>
-          </a:ln>
-        </p:spPr>
-      </p:pic>
       <p:sp>
         <p:nvSpPr>
-          <p:cNvPr id="215" name="Google Shape;215;p25"/>
+          <p:cNvPr id="227" name="Google Shape;227;p26"/>
           <p:cNvSpPr txBox="1"/>
           <p:nvPr/>
         </p:nvSpPr>
         <p:spPr>
           <a:xfrm>
-            <a:off x="4687325" y="3355075"/>
-            <a:ext cx="2894400" cy="1030200"/>
+            <a:off x="5030375" y="2571750"/>
+            <a:ext cx="2894400" cy="346200"/>
           </a:xfrm>
           <a:prstGeom prst="rect">
             <a:avLst/>
@@ -17561,7 +17627,7 @@
                   <a:srgbClr val="3C63AB"/>
                 </a:solidFill>
               </a:rPr>
-              <a:t>Pinta el resultado de la operación en el Jlabel.</a:t>
+              <a:t>Resultado final</a:t>
             </a:r>
             <a:endParaRPr b="0" i="0" sz="1700" u="none" cap="none" strike="noStrike">
               <a:solidFill>
@@ -17575,141 +17641,23 @@
           </a:p>
         </p:txBody>
       </p:sp>
-    </p:spTree>
-  </p:cSld>
-  <p:clrMapOvr>
-    <a:masterClrMapping/>
-  </p:clrMapOvr>
-</p:sld>
-</file>
-
-<file path=ppt/slides/slide12.xml><?xml version="1.0" encoding="utf-8"?>
-<p:sld xmlns:a="http://schemas.openxmlformats.org/drawingml/2006/main" xmlns:r="http://schemas.openxmlformats.org/officeDocument/2006/relationships" xmlns:mc="http://schemas.openxmlformats.org/markup-compatibility/2006" xmlns:mv="urn:schemas-microsoft-com:mac:vml" xmlns:p="http://schemas.openxmlformats.org/presentationml/2006/main" xmlns:c="http://schemas.openxmlformats.org/drawingml/2006/chart" xmlns:dgm="http://schemas.openxmlformats.org/drawingml/2006/diagram" xmlns:o="urn:schemas-microsoft-com:office:office" xmlns:v="urn:schemas-microsoft-com:vml" xmlns:pvml="urn:schemas-microsoft-com:office:powerpoint" xmlns:com="http://schemas.openxmlformats.org/drawingml/2006/compatibility" xmlns:p14="http://schemas.microsoft.com/office/powerpoint/2010/main" xmlns:p15="http://schemas.microsoft.com/office/powerpoint/2012/main" xmlns:ahyp="http://schemas.microsoft.com/office/drawing/2018/hyperlinkcolor" showMasterSp="0">
-  <p:cSld>
-    <p:bg>
-      <p:bgPr>
-        <a:blipFill>
-          <a:blip r:embed="rId3">
-            <a:alphaModFix/>
-          </a:blip>
-          <a:stretch>
-            <a:fillRect/>
-          </a:stretch>
-        </a:blipFill>
-      </p:bgPr>
-    </p:bg>
-    <p:spTree>
-      <p:nvGrpSpPr>
-        <p:cNvPr id="219" name="Shape 219"/>
-        <p:cNvGrpSpPr/>
-        <p:nvPr/>
-      </p:nvGrpSpPr>
-      <p:grpSpPr>
-        <a:xfrm>
-          <a:off x="0" y="0"/>
-          <a:ext cx="0" cy="0"/>
-          <a:chOff x="0" y="0"/>
-          <a:chExt cx="0" cy="0"/>
-        </a:xfrm>
-      </p:grpSpPr>
-      <p:sp>
-        <p:nvSpPr>
-          <p:cNvPr id="220" name="Google Shape;220;p26"/>
-          <p:cNvSpPr txBox="1"/>
-          <p:nvPr>
-            <p:ph type="title"/>
-          </p:nvPr>
-        </p:nvSpPr>
-        <p:spPr>
-          <a:xfrm>
-            <a:off x="870550" y="703300"/>
-            <a:ext cx="7505700" cy="618000"/>
-          </a:xfrm>
-          <a:prstGeom prst="rect">
-            <a:avLst/>
-          </a:prstGeom>
-          <a:noFill/>
-          <a:ln>
-            <a:noFill/>
-          </a:ln>
-        </p:spPr>
-        <p:txBody>
-          <a:bodyPr anchorCtr="0" anchor="b" bIns="34275" lIns="68575" spcFirstLastPara="1" rIns="68575" wrap="square" tIns="34275">
-            <a:noAutofit/>
-          </a:bodyPr>
-          <a:lstStyle/>
-          <a:p>
-            <a:pPr indent="0" lvl="0" marL="0" rtl="0" algn="l">
-              <a:lnSpc>
-                <a:spcPct val="85000"/>
-              </a:lnSpc>
-              <a:spcBef>
-                <a:spcPts val="0"/>
-              </a:spcBef>
-              <a:spcAft>
-                <a:spcPts val="0"/>
-              </a:spcAft>
-              <a:buClr>
-                <a:srgbClr val="3F3F3F"/>
-              </a:buClr>
-              <a:buSzPts val="3600"/>
-              <a:buFont typeface="Calibri"/>
-              <a:buNone/>
-            </a:pPr>
-            <a:r>
-              <a:rPr lang="es">
-                <a:solidFill>
-                  <a:srgbClr val="E83464"/>
-                </a:solidFill>
-                <a:latin typeface="Arial"/>
-                <a:ea typeface="Arial"/>
-                <a:cs typeface="Arial"/>
-                <a:sym typeface="Arial"/>
-              </a:rPr>
-              <a:t>Código del ejemplo</a:t>
-            </a:r>
-            <a:r>
-              <a:rPr lang="es" sz="2800">
-                <a:solidFill>
-                  <a:srgbClr val="E83464"/>
-                </a:solidFill>
-                <a:latin typeface="Arial"/>
-                <a:ea typeface="Arial"/>
-                <a:cs typeface="Arial"/>
-                <a:sym typeface="Arial"/>
-              </a:rPr>
-              <a:t>: Calculadora</a:t>
-            </a:r>
-            <a:endParaRPr sz="2800">
-              <a:solidFill>
-                <a:srgbClr val="E83464"/>
-              </a:solidFill>
-              <a:latin typeface="Arial"/>
-              <a:ea typeface="Arial"/>
-              <a:cs typeface="Arial"/>
-              <a:sym typeface="Arial"/>
-            </a:endParaRPr>
-          </a:p>
-        </p:txBody>
-      </p:sp>
       <p:pic>
         <p:nvPicPr>
-          <p:cNvPr id="221" name="Google Shape;221;p26"/>
+          <p:cNvPr id="228" name="Google Shape;228;p26"/>
           <p:cNvPicPr preferRelativeResize="0"/>
           <p:nvPr/>
         </p:nvPicPr>
-        <p:blipFill>
+        <p:blipFill rotWithShape="1">
           <a:blip r:embed="rId4">
             <a:alphaModFix/>
           </a:blip>
-          <a:stretch>
-            <a:fillRect/>
-          </a:stretch>
+          <a:srcRect b="22028" l="21747" r="13852" t="5487"/>
+          <a:stretch/>
         </p:blipFill>
         <p:spPr>
           <a:xfrm>
-            <a:off x="1152950" y="1321300"/>
-            <a:ext cx="2838475" cy="3621725"/>
+            <a:off x="1485900" y="1571625"/>
+            <a:ext cx="2894400" cy="3257766"/>
           </a:xfrm>
           <a:prstGeom prst="rect">
             <a:avLst/>
@@ -17720,68 +17668,6 @@
           </a:ln>
         </p:spPr>
       </p:pic>
-      <p:sp>
-        <p:nvSpPr>
-          <p:cNvPr id="222" name="Google Shape;222;p26"/>
-          <p:cNvSpPr txBox="1"/>
-          <p:nvPr/>
-        </p:nvSpPr>
-        <p:spPr>
-          <a:xfrm>
-            <a:off x="4949525" y="2225525"/>
-            <a:ext cx="2894400" cy="1030200"/>
-          </a:xfrm>
-          <a:prstGeom prst="rect">
-            <a:avLst/>
-          </a:prstGeom>
-          <a:noFill/>
-          <a:ln>
-            <a:noFill/>
-          </a:ln>
-        </p:spPr>
-        <p:txBody>
-          <a:bodyPr anchorCtr="0" anchor="t" bIns="34275" lIns="68575" spcFirstLastPara="1" rIns="68575" wrap="square" tIns="34275">
-            <a:noAutofit/>
-          </a:bodyPr>
-          <a:lstStyle/>
-          <a:p>
-            <a:pPr indent="0" lvl="0" marL="0" marR="0" rtl="0" algn="l">
-              <a:lnSpc>
-                <a:spcPct val="85000"/>
-              </a:lnSpc>
-              <a:spcBef>
-                <a:spcPts val="0"/>
-              </a:spcBef>
-              <a:spcAft>
-                <a:spcPts val="0"/>
-              </a:spcAft>
-              <a:buClr>
-                <a:srgbClr val="3F3F3F"/>
-              </a:buClr>
-              <a:buSzPts val="3600"/>
-              <a:buFont typeface="Calibri"/>
-              <a:buNone/>
-            </a:pPr>
-            <a:r>
-              <a:rPr lang="es" sz="1700">
-                <a:solidFill>
-                  <a:srgbClr val="3C63AB"/>
-                </a:solidFill>
-              </a:rPr>
-              <a:t>Función que valida y ejecuta la respectiva operación</a:t>
-            </a:r>
-            <a:endParaRPr b="0" i="0" sz="1700" u="none" cap="none" strike="noStrike">
-              <a:solidFill>
-                <a:srgbClr val="3C63AB"/>
-              </a:solidFill>
-              <a:latin typeface="Arial"/>
-              <a:ea typeface="Arial"/>
-              <a:cs typeface="Arial"/>
-              <a:sym typeface="Arial"/>
-            </a:endParaRPr>
-          </a:p>
-        </p:txBody>
-      </p:sp>
     </p:spTree>
   </p:cSld>
   <p:clrMapOvr>
@@ -17807,7 +17693,7 @@
     </p:bg>
     <p:spTree>
       <p:nvGrpSpPr>
-        <p:cNvPr id="226" name="Shape 226"/>
+        <p:cNvPr id="232" name="Shape 232"/>
         <p:cNvGrpSpPr/>
         <p:nvPr/>
       </p:nvGrpSpPr>
@@ -17821,213 +17707,7 @@
       </p:grpSpPr>
       <p:sp>
         <p:nvSpPr>
-          <p:cNvPr id="227" name="Google Shape;227;p27"/>
-          <p:cNvSpPr txBox="1"/>
-          <p:nvPr>
-            <p:ph type="title"/>
-          </p:nvPr>
-        </p:nvSpPr>
-        <p:spPr>
-          <a:xfrm>
-            <a:off x="870550" y="804150"/>
-            <a:ext cx="7505700" cy="618000"/>
-          </a:xfrm>
-          <a:prstGeom prst="rect">
-            <a:avLst/>
-          </a:prstGeom>
-          <a:noFill/>
-          <a:ln>
-            <a:noFill/>
-          </a:ln>
-        </p:spPr>
-        <p:txBody>
-          <a:bodyPr anchorCtr="0" anchor="b" bIns="34275" lIns="68575" spcFirstLastPara="1" rIns="68575" wrap="square" tIns="34275">
-            <a:noAutofit/>
-          </a:bodyPr>
-          <a:lstStyle/>
-          <a:p>
-            <a:pPr indent="0" lvl="0" marL="0" rtl="0" algn="l">
-              <a:lnSpc>
-                <a:spcPct val="85000"/>
-              </a:lnSpc>
-              <a:spcBef>
-                <a:spcPts val="0"/>
-              </a:spcBef>
-              <a:spcAft>
-                <a:spcPts val="0"/>
-              </a:spcAft>
-              <a:buClr>
-                <a:srgbClr val="3F3F3F"/>
-              </a:buClr>
-              <a:buSzPts val="3600"/>
-              <a:buFont typeface="Calibri"/>
-              <a:buNone/>
-            </a:pPr>
-            <a:r>
-              <a:rPr lang="es">
-                <a:solidFill>
-                  <a:srgbClr val="E83464"/>
-                </a:solidFill>
-                <a:latin typeface="Arial"/>
-                <a:ea typeface="Arial"/>
-                <a:cs typeface="Arial"/>
-                <a:sym typeface="Arial"/>
-              </a:rPr>
-              <a:t>Código del ejemplo</a:t>
-            </a:r>
-            <a:r>
-              <a:rPr lang="es" sz="2800">
-                <a:solidFill>
-                  <a:srgbClr val="E83464"/>
-                </a:solidFill>
-                <a:latin typeface="Arial"/>
-                <a:ea typeface="Arial"/>
-                <a:cs typeface="Arial"/>
-                <a:sym typeface="Arial"/>
-              </a:rPr>
-              <a:t>: Calculadora</a:t>
-            </a:r>
-            <a:endParaRPr sz="2800">
-              <a:solidFill>
-                <a:srgbClr val="E83464"/>
-              </a:solidFill>
-              <a:latin typeface="Arial"/>
-              <a:ea typeface="Arial"/>
-              <a:cs typeface="Arial"/>
-              <a:sym typeface="Arial"/>
-            </a:endParaRPr>
-          </a:p>
-        </p:txBody>
-      </p:sp>
-      <p:pic>
-        <p:nvPicPr>
-          <p:cNvPr id="228" name="Google Shape;228;p27"/>
-          <p:cNvPicPr preferRelativeResize="0"/>
-          <p:nvPr/>
-        </p:nvPicPr>
-        <p:blipFill rotWithShape="1">
-          <a:blip r:embed="rId4">
-            <a:alphaModFix/>
-          </a:blip>
-          <a:srcRect b="3518" l="24016" r="39852" t="14453"/>
-          <a:stretch/>
-        </p:blipFill>
-        <p:spPr>
-          <a:xfrm>
-            <a:off x="1937850" y="1473525"/>
-            <a:ext cx="2728350" cy="3483025"/>
-          </a:xfrm>
-          <a:prstGeom prst="rect">
-            <a:avLst/>
-          </a:prstGeom>
-          <a:noFill/>
-          <a:ln>
-            <a:noFill/>
-          </a:ln>
-        </p:spPr>
-      </p:pic>
-      <p:sp>
-        <p:nvSpPr>
-          <p:cNvPr id="229" name="Google Shape;229;p27"/>
-          <p:cNvSpPr txBox="1"/>
-          <p:nvPr/>
-        </p:nvSpPr>
-        <p:spPr>
-          <a:xfrm>
-            <a:off x="5030375" y="2571750"/>
-            <a:ext cx="2894400" cy="346200"/>
-          </a:xfrm>
-          <a:prstGeom prst="rect">
-            <a:avLst/>
-          </a:prstGeom>
-          <a:noFill/>
-          <a:ln>
-            <a:noFill/>
-          </a:ln>
-        </p:spPr>
-        <p:txBody>
-          <a:bodyPr anchorCtr="0" anchor="t" bIns="34275" lIns="68575" spcFirstLastPara="1" rIns="68575" wrap="square" tIns="34275">
-            <a:noAutofit/>
-          </a:bodyPr>
-          <a:lstStyle/>
-          <a:p>
-            <a:pPr indent="0" lvl="0" marL="0" marR="0" rtl="0" algn="l">
-              <a:lnSpc>
-                <a:spcPct val="85000"/>
-              </a:lnSpc>
-              <a:spcBef>
-                <a:spcPts val="0"/>
-              </a:spcBef>
-              <a:spcAft>
-                <a:spcPts val="0"/>
-              </a:spcAft>
-              <a:buClr>
-                <a:srgbClr val="3F3F3F"/>
-              </a:buClr>
-              <a:buSzPts val="3600"/>
-              <a:buFont typeface="Calibri"/>
-              <a:buNone/>
-            </a:pPr>
-            <a:r>
-              <a:rPr lang="es" sz="1700">
-                <a:solidFill>
-                  <a:srgbClr val="3C63AB"/>
-                </a:solidFill>
-              </a:rPr>
-              <a:t>Resultado final</a:t>
-            </a:r>
-            <a:endParaRPr b="0" i="0" sz="1700" u="none" cap="none" strike="noStrike">
-              <a:solidFill>
-                <a:srgbClr val="3C63AB"/>
-              </a:solidFill>
-              <a:latin typeface="Arial"/>
-              <a:ea typeface="Arial"/>
-              <a:cs typeface="Arial"/>
-              <a:sym typeface="Arial"/>
-            </a:endParaRPr>
-          </a:p>
-        </p:txBody>
-      </p:sp>
-    </p:spTree>
-  </p:cSld>
-  <p:clrMapOvr>
-    <a:masterClrMapping/>
-  </p:clrMapOvr>
-</p:sld>
-</file>
-
-<file path=ppt/slides/slide14.xml><?xml version="1.0" encoding="utf-8"?>
-<p:sld xmlns:a="http://schemas.openxmlformats.org/drawingml/2006/main" xmlns:r="http://schemas.openxmlformats.org/officeDocument/2006/relationships" xmlns:mc="http://schemas.openxmlformats.org/markup-compatibility/2006" xmlns:mv="urn:schemas-microsoft-com:mac:vml" xmlns:p="http://schemas.openxmlformats.org/presentationml/2006/main" xmlns:c="http://schemas.openxmlformats.org/drawingml/2006/chart" xmlns:dgm="http://schemas.openxmlformats.org/drawingml/2006/diagram" xmlns:o="urn:schemas-microsoft-com:office:office" xmlns:v="urn:schemas-microsoft-com:vml" xmlns:pvml="urn:schemas-microsoft-com:office:powerpoint" xmlns:com="http://schemas.openxmlformats.org/drawingml/2006/compatibility" xmlns:p14="http://schemas.microsoft.com/office/powerpoint/2010/main" xmlns:p15="http://schemas.microsoft.com/office/powerpoint/2012/main" xmlns:ahyp="http://schemas.microsoft.com/office/drawing/2018/hyperlinkcolor" showMasterSp="0">
-  <p:cSld>
-    <p:bg>
-      <p:bgPr>
-        <a:blipFill>
-          <a:blip r:embed="rId3">
-            <a:alphaModFix/>
-          </a:blip>
-          <a:stretch>
-            <a:fillRect/>
-          </a:stretch>
-        </a:blipFill>
-      </p:bgPr>
-    </p:bg>
-    <p:spTree>
-      <p:nvGrpSpPr>
-        <p:cNvPr id="233" name="Shape 233"/>
-        <p:cNvGrpSpPr/>
-        <p:nvPr/>
-      </p:nvGrpSpPr>
-      <p:grpSpPr>
-        <a:xfrm>
-          <a:off x="0" y="0"/>
-          <a:ext cx="0" cy="0"/>
-          <a:chOff x="0" y="0"/>
-          <a:chExt cx="0" cy="0"/>
-        </a:xfrm>
-      </p:grpSpPr>
-      <p:sp>
-        <p:nvSpPr>
-          <p:cNvPr id="234" name="Google Shape;234;p28"/>
+          <p:cNvPr id="233" name="Google Shape;233;p27"/>
           <p:cNvSpPr txBox="1"/>
           <p:nvPr/>
         </p:nvSpPr>
@@ -18107,12 +17787,12 @@
 </p:sld>
 </file>
 
-<file path=ppt/slides/slide15.xml><?xml version="1.0" encoding="utf-8"?>
+<file path=ppt/slides/slide14.xml><?xml version="1.0" encoding="utf-8"?>
 <p:sld xmlns:a="http://schemas.openxmlformats.org/drawingml/2006/main" xmlns:r="http://schemas.openxmlformats.org/officeDocument/2006/relationships" xmlns:mc="http://schemas.openxmlformats.org/markup-compatibility/2006" xmlns:mv="urn:schemas-microsoft-com:mac:vml" xmlns:p="http://schemas.openxmlformats.org/presentationml/2006/main" xmlns:c="http://schemas.openxmlformats.org/drawingml/2006/chart" xmlns:dgm="http://schemas.openxmlformats.org/drawingml/2006/diagram" xmlns:o="urn:schemas-microsoft-com:office:office" xmlns:v="urn:schemas-microsoft-com:vml" xmlns:pvml="urn:schemas-microsoft-com:office:powerpoint" xmlns:com="http://schemas.openxmlformats.org/drawingml/2006/compatibility" xmlns:p14="http://schemas.microsoft.com/office/powerpoint/2010/main" xmlns:p15="http://schemas.microsoft.com/office/powerpoint/2012/main" xmlns:ahyp="http://schemas.microsoft.com/office/drawing/2018/hyperlinkcolor">
   <p:cSld>
     <p:spTree>
       <p:nvGrpSpPr>
-        <p:cNvPr id="238" name="Shape 238"/>
+        <p:cNvPr id="237" name="Shape 237"/>
         <p:cNvGrpSpPr/>
         <p:nvPr/>
       </p:nvGrpSpPr>
@@ -18126,7 +17806,7 @@
       </p:grpSpPr>
       <p:pic>
         <p:nvPicPr>
-          <p:cNvPr id="239" name="Google Shape;239;p29"/>
+          <p:cNvPr id="238" name="Google Shape;238;p28"/>
           <p:cNvPicPr preferRelativeResize="0"/>
           <p:nvPr/>
         </p:nvPicPr>
@@ -18734,7 +18414,7 @@
         </p:nvSpPr>
         <p:spPr>
           <a:xfrm>
-            <a:off x="1052100" y="723475"/>
+            <a:off x="1105000" y="1106375"/>
             <a:ext cx="7505700" cy="618000"/>
           </a:xfrm>
           <a:prstGeom prst="rect">
@@ -18778,7 +18458,7 @@
                 <a:cs typeface="Arial"/>
                 <a:sym typeface="Arial"/>
               </a:rPr>
-              <a:t>Ejemplo de Diseño de Interfaz: Calculadora</a:t>
+              <a:t>Ejemplo de Diseño de Interfaz Gráfica: Calculadora</a:t>
             </a:r>
             <a:endParaRPr sz="2800">
               <a:solidFill>
@@ -18792,167 +18472,24 @@
           </a:p>
         </p:txBody>
       </p:sp>
-      <p:sp>
-        <p:nvSpPr>
-          <p:cNvPr id="162" name="Google Shape;162;p18"/>
-          <p:cNvSpPr txBox="1"/>
-          <p:nvPr>
-            <p:ph idx="4294967295" type="body"/>
-          </p:nvPr>
-        </p:nvSpPr>
-        <p:spPr>
-          <a:xfrm>
-            <a:off x="870550" y="1724375"/>
-            <a:ext cx="7974600" cy="3489300"/>
-          </a:xfrm>
-          <a:prstGeom prst="rect">
-            <a:avLst/>
-          </a:prstGeom>
-          <a:noFill/>
-          <a:ln cap="flat" cmpd="sng" w="9525">
-            <a:solidFill>
-              <a:schemeClr val="dk1"/>
-            </a:solidFill>
-            <a:prstDash val="solid"/>
-            <a:round/>
-            <a:headEnd len="sm" w="sm" type="none"/>
-            <a:tailEnd len="sm" w="sm" type="none"/>
-          </a:ln>
-        </p:spPr>
-        <p:txBody>
-          <a:bodyPr anchorCtr="0" anchor="t" bIns="34275" lIns="0" spcFirstLastPara="1" rIns="0" wrap="square" tIns="34275">
-            <a:noAutofit/>
-          </a:bodyPr>
-          <a:lstStyle/>
-          <a:p>
-            <a:pPr indent="0" lvl="0" marL="0" rtl="0" algn="l">
-              <a:lnSpc>
-                <a:spcPct val="90000"/>
-              </a:lnSpc>
-              <a:spcBef>
-                <a:spcPts val="0"/>
-              </a:spcBef>
-              <a:spcAft>
-                <a:spcPts val="0"/>
-              </a:spcAft>
-              <a:buNone/>
-            </a:pPr>
-            <a:r>
-              <a:t/>
-            </a:r>
-            <a:endParaRPr sz="1400">
-              <a:solidFill>
-                <a:srgbClr val="3C63AB"/>
-              </a:solidFill>
-              <a:latin typeface="Arial"/>
-              <a:ea typeface="Arial"/>
-              <a:cs typeface="Arial"/>
-              <a:sym typeface="Arial"/>
-            </a:endParaRPr>
-          </a:p>
-          <a:p>
-            <a:pPr indent="0" lvl="0" marL="0" rtl="0" algn="l">
-              <a:lnSpc>
-                <a:spcPct val="90000"/>
-              </a:lnSpc>
-              <a:spcBef>
-                <a:spcPts val="0"/>
-              </a:spcBef>
-              <a:spcAft>
-                <a:spcPts val="0"/>
-              </a:spcAft>
-              <a:buNone/>
-            </a:pPr>
-            <a:r>
-              <a:t/>
-            </a:r>
-            <a:endParaRPr sz="1400">
-              <a:solidFill>
-                <a:srgbClr val="3C63AB"/>
-              </a:solidFill>
-              <a:latin typeface="Arial"/>
-              <a:ea typeface="Arial"/>
-              <a:cs typeface="Arial"/>
-              <a:sym typeface="Arial"/>
-            </a:endParaRPr>
-          </a:p>
-          <a:p>
-            <a:pPr indent="0" lvl="0" marL="0" rtl="0" algn="l">
-              <a:lnSpc>
-                <a:spcPct val="90000"/>
-              </a:lnSpc>
-              <a:spcBef>
-                <a:spcPts val="600"/>
-              </a:spcBef>
-              <a:spcAft>
-                <a:spcPts val="0"/>
-              </a:spcAft>
-              <a:buNone/>
-            </a:pPr>
-            <a:r>
-              <a:t/>
-            </a:r>
-            <a:endParaRPr sz="1200">
-              <a:solidFill>
-                <a:srgbClr val="000000"/>
-              </a:solidFill>
-              <a:highlight>
-                <a:srgbClr val="FFFFFF"/>
-              </a:highlight>
-              <a:latin typeface="Arial"/>
-              <a:ea typeface="Arial"/>
-              <a:cs typeface="Arial"/>
-              <a:sym typeface="Arial"/>
-            </a:endParaRPr>
-          </a:p>
-          <a:p>
-            <a:pPr indent="0" lvl="0" marL="0" rtl="0" algn="l">
-              <a:lnSpc>
-                <a:spcPct val="90000"/>
-              </a:lnSpc>
-              <a:spcBef>
-                <a:spcPts val="600"/>
-              </a:spcBef>
-              <a:spcAft>
-                <a:spcPts val="0"/>
-              </a:spcAft>
-              <a:buNone/>
-            </a:pPr>
-            <a:r>
-              <a:t/>
-            </a:r>
-            <a:endParaRPr sz="1200">
-              <a:solidFill>
-                <a:srgbClr val="000000"/>
-              </a:solidFill>
-              <a:highlight>
-                <a:srgbClr val="FFFFFF"/>
-              </a:highlight>
-              <a:latin typeface="Arial"/>
-              <a:ea typeface="Arial"/>
-              <a:cs typeface="Arial"/>
-              <a:sym typeface="Arial"/>
-            </a:endParaRPr>
-          </a:p>
-        </p:txBody>
-      </p:sp>
       <p:pic>
         <p:nvPicPr>
-          <p:cNvPr id="163" name="Google Shape;163;p18"/>
+          <p:cNvPr id="162" name="Google Shape;162;p18"/>
           <p:cNvPicPr preferRelativeResize="0"/>
           <p:nvPr/>
         </p:nvPicPr>
-        <p:blipFill rotWithShape="1">
+        <p:blipFill>
           <a:blip r:embed="rId4">
             <a:alphaModFix/>
           </a:blip>
-          <a:srcRect b="5439" l="9158" r="10500" t="3135"/>
-          <a:stretch/>
+          <a:stretch>
+            <a:fillRect/>
+          </a:stretch>
         </p:blipFill>
         <p:spPr>
           <a:xfrm>
-            <a:off x="2962700" y="1299225"/>
-            <a:ext cx="2561675" cy="3789350"/>
+            <a:off x="3495275" y="1557525"/>
+            <a:ext cx="2725150" cy="3170074"/>
           </a:xfrm>
           <a:prstGeom prst="rect">
             <a:avLst/>
@@ -18988,7 +18525,7 @@
     </p:bg>
     <p:spTree>
       <p:nvGrpSpPr>
-        <p:cNvPr id="167" name="Shape 167"/>
+        <p:cNvPr id="166" name="Shape 166"/>
         <p:cNvGrpSpPr/>
         <p:nvPr/>
       </p:nvGrpSpPr>
@@ -19002,7 +18539,7 @@
       </p:grpSpPr>
       <p:sp>
         <p:nvSpPr>
-          <p:cNvPr id="168" name="Google Shape;168;p19"/>
+          <p:cNvPr id="167" name="Google Shape;167;p19"/>
           <p:cNvSpPr txBox="1"/>
           <p:nvPr>
             <p:ph type="title"/>
@@ -19010,7 +18547,7 @@
         </p:nvSpPr>
         <p:spPr>
           <a:xfrm>
-            <a:off x="870550" y="804150"/>
+            <a:off x="965650" y="1201800"/>
             <a:ext cx="7505700" cy="618000"/>
           </a:xfrm>
           <a:prstGeom prst="rect">
@@ -19054,7 +18591,7 @@
                 <a:cs typeface="Arial"/>
                 <a:sym typeface="Arial"/>
               </a:rPr>
-              <a:t>Código del ejemplo</a:t>
+              <a:t>Código del ejemplo utilizando Scene Builder</a:t>
             </a:r>
             <a:r>
               <a:rPr lang="es" sz="2800">
@@ -19080,44 +18617,16 @@
           </a:p>
         </p:txBody>
       </p:sp>
-      <p:pic>
-        <p:nvPicPr>
-          <p:cNvPr id="169" name="Google Shape;169;p19"/>
-          <p:cNvPicPr preferRelativeResize="0"/>
-          <p:nvPr/>
-        </p:nvPicPr>
-        <p:blipFill>
-          <a:blip r:embed="rId4">
-            <a:alphaModFix/>
-          </a:blip>
-          <a:stretch>
-            <a:fillRect/>
-          </a:stretch>
-        </p:blipFill>
-        <p:spPr>
-          <a:xfrm>
-            <a:off x="50500" y="2209273"/>
-            <a:ext cx="9043001" cy="1527602"/>
-          </a:xfrm>
-          <a:prstGeom prst="rect">
-            <a:avLst/>
-          </a:prstGeom>
-          <a:noFill/>
-          <a:ln>
-            <a:noFill/>
-          </a:ln>
-        </p:spPr>
-      </p:pic>
       <p:sp>
         <p:nvSpPr>
-          <p:cNvPr id="170" name="Google Shape;170;p19"/>
+          <p:cNvPr id="168" name="Google Shape;168;p19"/>
           <p:cNvSpPr txBox="1"/>
           <p:nvPr/>
         </p:nvSpPr>
         <p:spPr>
           <a:xfrm>
-            <a:off x="223000" y="1665200"/>
-            <a:ext cx="3000000" cy="446400"/>
+            <a:off x="6227750" y="2357875"/>
+            <a:ext cx="1685700" cy="831300"/>
           </a:xfrm>
           <a:prstGeom prst="rect">
             <a:avLst/>
@@ -19134,9 +18643,6 @@
           <a:lstStyle/>
           <a:p>
             <a:pPr indent="0" lvl="0" marL="0" rtl="0" algn="l">
-              <a:lnSpc>
-                <a:spcPct val="85000"/>
-              </a:lnSpc>
               <a:spcBef>
                 <a:spcPts val="0"/>
               </a:spcBef>
@@ -19146,17 +18652,56 @@
               <a:buNone/>
             </a:pPr>
             <a:r>
-              <a:rPr lang="es" sz="2000">
-                <a:solidFill>
-                  <a:srgbClr val="3C63AB"/>
-                </a:solidFill>
+              <a:rPr lang="es">
+                <a:solidFill>
+                  <a:srgbClr val="3D4594"/>
+                </a:solidFill>
+                <a:latin typeface="Calibri"/>
+                <a:ea typeface="Calibri"/>
+                <a:cs typeface="Calibri"/>
+                <a:sym typeface="Calibri"/>
               </a:rPr>
-              <a:t>Librerías</a:t>
+              <a:t>Se construye el layout arrastrando los componentes</a:t>
             </a:r>
-            <a:endParaRPr/>
+            <a:endParaRPr>
+              <a:solidFill>
+                <a:srgbClr val="3D4594"/>
+              </a:solidFill>
+              <a:latin typeface="Calibri"/>
+              <a:ea typeface="Calibri"/>
+              <a:cs typeface="Calibri"/>
+              <a:sym typeface="Calibri"/>
+            </a:endParaRPr>
           </a:p>
         </p:txBody>
       </p:sp>
+      <p:pic>
+        <p:nvPicPr>
+          <p:cNvPr id="169" name="Google Shape;169;p19"/>
+          <p:cNvPicPr preferRelativeResize="0"/>
+          <p:nvPr/>
+        </p:nvPicPr>
+        <p:blipFill rotWithShape="1">
+          <a:blip r:embed="rId4">
+            <a:alphaModFix/>
+          </a:blip>
+          <a:srcRect b="4870" l="0" r="0" t="0"/>
+          <a:stretch/>
+        </p:blipFill>
+        <p:spPr>
+          <a:xfrm>
+            <a:off x="714375" y="1905000"/>
+            <a:ext cx="5393549" cy="2886076"/>
+          </a:xfrm>
+          <a:prstGeom prst="rect">
+            <a:avLst/>
+          </a:prstGeom>
+          <a:noFill/>
+          <a:ln>
+            <a:noFill/>
+          </a:ln>
+        </p:spPr>
+      </p:pic>
     </p:spTree>
   </p:cSld>
   <p:clrMapOvr>
@@ -19182,7 +18727,7 @@
     </p:bg>
     <p:spTree>
       <p:nvGrpSpPr>
-        <p:cNvPr id="174" name="Shape 174"/>
+        <p:cNvPr id="173" name="Shape 173"/>
         <p:cNvGrpSpPr/>
         <p:nvPr/>
       </p:nvGrpSpPr>
@@ -19194,18 +18739,43 @@
           <a:chExt cx="0" cy="0"/>
         </a:xfrm>
       </p:grpSpPr>
+      <p:pic>
+        <p:nvPicPr>
+          <p:cNvPr id="174" name="Google Shape;174;p20"/>
+          <p:cNvPicPr preferRelativeResize="0"/>
+          <p:nvPr/>
+        </p:nvPicPr>
+        <p:blipFill rotWithShape="1">
+          <a:blip r:embed="rId4">
+            <a:alphaModFix/>
+          </a:blip>
+          <a:srcRect b="4329" l="0" r="0" t="4329"/>
+          <a:stretch/>
+        </p:blipFill>
+        <p:spPr>
+          <a:xfrm>
+            <a:off x="252275" y="2318275"/>
+            <a:ext cx="4572000" cy="2348976"/>
+          </a:xfrm>
+          <a:prstGeom prst="rect">
+            <a:avLst/>
+          </a:prstGeom>
+          <a:noFill/>
+          <a:ln>
+            <a:noFill/>
+          </a:ln>
+        </p:spPr>
+      </p:pic>
       <p:sp>
         <p:nvSpPr>
           <p:cNvPr id="175" name="Google Shape;175;p20"/>
           <p:cNvSpPr txBox="1"/>
-          <p:nvPr>
-            <p:ph type="title"/>
-          </p:nvPr>
+          <p:nvPr/>
         </p:nvSpPr>
         <p:spPr>
           <a:xfrm>
-            <a:off x="870550" y="804150"/>
-            <a:ext cx="7505700" cy="618000"/>
+            <a:off x="1013200" y="931922"/>
+            <a:ext cx="7543800" cy="625500"/>
           </a:xfrm>
           <a:prstGeom prst="rect">
             <a:avLst/>
@@ -19231,67 +18801,34 @@
               <a:spcAft>
                 <a:spcPts val="0"/>
               </a:spcAft>
-              <a:buClr>
-                <a:srgbClr val="3F3F3F"/>
-              </a:buClr>
-              <a:buSzPts val="3600"/>
-              <a:buFont typeface="Calibri"/>
               <a:buNone/>
             </a:pPr>
             <a:r>
-              <a:rPr lang="es">
+              <a:rPr lang="es" sz="2300">
                 <a:solidFill>
                   <a:srgbClr val="E83464"/>
                 </a:solidFill>
-                <a:latin typeface="Arial"/>
-                <a:ea typeface="Arial"/>
-                <a:cs typeface="Arial"/>
-                <a:sym typeface="Arial"/>
               </a:rPr>
-              <a:t>Código del ejemplo</a:t>
+              <a:t>Código del ejemplo utilizando Scene Builder: Calculadora</a:t>
             </a:r>
-            <a:r>
-              <a:rPr lang="es" sz="2800">
-                <a:solidFill>
-                  <a:srgbClr val="E83464"/>
-                </a:solidFill>
-                <a:latin typeface="Arial"/>
-                <a:ea typeface="Arial"/>
-                <a:cs typeface="Arial"/>
-                <a:sym typeface="Arial"/>
-              </a:rPr>
-              <a:t>: Calculadora</a:t>
-            </a:r>
-            <a:endParaRPr sz="2800">
+            <a:endParaRPr sz="2300">
               <a:solidFill>
                 <a:srgbClr val="E83464"/>
               </a:solidFill>
-              <a:latin typeface="Arial"/>
-              <a:ea typeface="Arial"/>
-              <a:cs typeface="Arial"/>
-              <a:sym typeface="Arial"/>
             </a:endParaRPr>
           </a:p>
         </p:txBody>
       </p:sp>
-      <p:pic>
-        <p:nvPicPr>
+      <p:sp>
+        <p:nvSpPr>
           <p:cNvPr id="176" name="Google Shape;176;p20"/>
-          <p:cNvPicPr preferRelativeResize="0"/>
+          <p:cNvSpPr txBox="1"/>
           <p:nvPr/>
-        </p:nvPicPr>
-        <p:blipFill>
-          <a:blip r:embed="rId4">
-            <a:alphaModFix/>
-          </a:blip>
-          <a:stretch>
-            <a:fillRect/>
-          </a:stretch>
-        </p:blipFill>
+        </p:nvSpPr>
         <p:spPr>
           <a:xfrm>
-            <a:off x="2935950" y="1897338"/>
-            <a:ext cx="5614025" cy="674425"/>
+            <a:off x="5149225" y="1831788"/>
+            <a:ext cx="3089400" cy="400200"/>
           </a:xfrm>
           <a:prstGeom prst="rect">
             <a:avLst/>
@@ -19301,10 +18838,155 @@
             <a:noFill/>
           </a:ln>
         </p:spPr>
-      </p:pic>
+        <p:txBody>
+          <a:bodyPr anchorCtr="0" anchor="t" bIns="91425" lIns="91425" spcFirstLastPara="1" rIns="91425" wrap="square" tIns="91425">
+            <a:spAutoFit/>
+          </a:bodyPr>
+          <a:lstStyle/>
+          <a:p>
+            <a:pPr indent="0" lvl="0" marL="0" rtl="0" algn="l">
+              <a:spcBef>
+                <a:spcPts val="0"/>
+              </a:spcBef>
+              <a:spcAft>
+                <a:spcPts val="0"/>
+              </a:spcAft>
+              <a:buNone/>
+            </a:pPr>
+            <a:r>
+              <a:rPr lang="es">
+                <a:solidFill>
+                  <a:schemeClr val="accent5"/>
+                </a:solidFill>
+                <a:latin typeface="Calibri"/>
+                <a:ea typeface="Calibri"/>
+                <a:cs typeface="Calibri"/>
+                <a:sym typeface="Calibri"/>
+              </a:rPr>
+              <a:t>Asignar nombre al controlador</a:t>
+            </a:r>
+            <a:endParaRPr>
+              <a:solidFill>
+                <a:schemeClr val="accent5"/>
+              </a:solidFill>
+              <a:latin typeface="Calibri"/>
+              <a:ea typeface="Calibri"/>
+              <a:cs typeface="Calibri"/>
+              <a:sym typeface="Calibri"/>
+            </a:endParaRPr>
+          </a:p>
+        </p:txBody>
+      </p:sp>
+      <p:sp>
+        <p:nvSpPr>
+          <p:cNvPr id="177" name="Google Shape;177;p20"/>
+          <p:cNvSpPr txBox="1"/>
+          <p:nvPr/>
+        </p:nvSpPr>
+        <p:spPr>
+          <a:xfrm>
+            <a:off x="847900" y="1630050"/>
+            <a:ext cx="3089400" cy="615600"/>
+          </a:xfrm>
+          <a:prstGeom prst="rect">
+            <a:avLst/>
+          </a:prstGeom>
+          <a:noFill/>
+          <a:ln>
+            <a:noFill/>
+          </a:ln>
+        </p:spPr>
+        <p:txBody>
+          <a:bodyPr anchorCtr="0" anchor="t" bIns="91425" lIns="91425" spcFirstLastPara="1" rIns="91425" wrap="square" tIns="91425">
+            <a:spAutoFit/>
+          </a:bodyPr>
+          <a:lstStyle/>
+          <a:p>
+            <a:pPr indent="0" lvl="0" marL="0" rtl="0" algn="l">
+              <a:spcBef>
+                <a:spcPts val="0"/>
+              </a:spcBef>
+              <a:spcAft>
+                <a:spcPts val="0"/>
+              </a:spcAft>
+              <a:buNone/>
+            </a:pPr>
+            <a:r>
+              <a:rPr lang="es">
+                <a:solidFill>
+                  <a:schemeClr val="accent5"/>
+                </a:solidFill>
+                <a:latin typeface="Calibri"/>
+                <a:ea typeface="Calibri"/>
+                <a:cs typeface="Calibri"/>
+                <a:sym typeface="Calibri"/>
+              </a:rPr>
+              <a:t>Asignar identificadores únicos a cada componente</a:t>
+            </a:r>
+            <a:endParaRPr>
+              <a:solidFill>
+                <a:schemeClr val="accent5"/>
+              </a:solidFill>
+              <a:latin typeface="Calibri"/>
+              <a:ea typeface="Calibri"/>
+              <a:cs typeface="Calibri"/>
+              <a:sym typeface="Calibri"/>
+            </a:endParaRPr>
+          </a:p>
+        </p:txBody>
+      </p:sp>
+      <p:sp>
+        <p:nvSpPr>
+          <p:cNvPr id="178" name="Google Shape;178;p20"/>
+          <p:cNvSpPr/>
+          <p:nvPr/>
+        </p:nvSpPr>
+        <p:spPr>
+          <a:xfrm>
+            <a:off x="3852900" y="2733850"/>
+            <a:ext cx="1062000" cy="193500"/>
+          </a:xfrm>
+          <a:prstGeom prst="roundRect">
+            <a:avLst>
+              <a:gd fmla="val 16667" name="adj"/>
+            </a:avLst>
+          </a:prstGeom>
+          <a:noFill/>
+          <a:ln cap="flat" cmpd="sng" w="9525">
+            <a:solidFill>
+              <a:schemeClr val="accent6"/>
+            </a:solidFill>
+            <a:prstDash val="solid"/>
+            <a:round/>
+            <a:headEnd len="sm" w="sm" type="none"/>
+            <a:tailEnd len="sm" w="sm" type="none"/>
+          </a:ln>
+        </p:spPr>
+        <p:txBody>
+          <a:bodyPr anchorCtr="0" anchor="ctr" bIns="91425" lIns="91425" spcFirstLastPara="1" rIns="91425" wrap="square" tIns="91425">
+            <a:noAutofit/>
+          </a:bodyPr>
+          <a:lstStyle/>
+          <a:p>
+            <a:pPr indent="0" lvl="0" marL="0" rtl="0" algn="l">
+              <a:spcBef>
+                <a:spcPts val="0"/>
+              </a:spcBef>
+              <a:spcAft>
+                <a:spcPts val="0"/>
+              </a:spcAft>
+              <a:buNone/>
+            </a:pPr>
+            <a:r>
+              <a:t/>
+            </a:r>
+            <a:endParaRPr/>
+          </a:p>
+        </p:txBody>
+      </p:sp>
       <p:pic>
         <p:nvPicPr>
-          <p:cNvPr id="177" name="Google Shape;177;p20"/>
+          <p:cNvPr id="179" name="Google Shape;179;p20"/>
           <p:cNvPicPr preferRelativeResize="0"/>
           <p:nvPr/>
         </p:nvPicPr>
@@ -19318,8 +19000,8 @@
         </p:blipFill>
         <p:spPr>
           <a:xfrm>
-            <a:off x="475125" y="3261150"/>
-            <a:ext cx="5070950" cy="952725"/>
+            <a:off x="5149225" y="2318273"/>
+            <a:ext cx="3605950" cy="1244825"/>
           </a:xfrm>
           <a:prstGeom prst="rect">
             <a:avLst/>
@@ -19330,130 +19012,6 @@
           </a:ln>
         </p:spPr>
       </p:pic>
-      <p:sp>
-        <p:nvSpPr>
-          <p:cNvPr id="178" name="Google Shape;178;p20"/>
-          <p:cNvSpPr txBox="1"/>
-          <p:nvPr/>
-        </p:nvSpPr>
-        <p:spPr>
-          <a:xfrm>
-            <a:off x="754941" y="2023788"/>
-            <a:ext cx="2181000" cy="421500"/>
-          </a:xfrm>
-          <a:prstGeom prst="rect">
-            <a:avLst/>
-          </a:prstGeom>
-          <a:noFill/>
-          <a:ln>
-            <a:noFill/>
-          </a:ln>
-        </p:spPr>
-        <p:txBody>
-          <a:bodyPr anchorCtr="0" anchor="b" bIns="34275" lIns="68575" spcFirstLastPara="1" rIns="68575" wrap="square" tIns="34275">
-            <a:noAutofit/>
-          </a:bodyPr>
-          <a:lstStyle/>
-          <a:p>
-            <a:pPr indent="0" lvl="0" marL="0" marR="0" rtl="0" algn="l">
-              <a:lnSpc>
-                <a:spcPct val="85000"/>
-              </a:lnSpc>
-              <a:spcBef>
-                <a:spcPts val="0"/>
-              </a:spcBef>
-              <a:spcAft>
-                <a:spcPts val="0"/>
-              </a:spcAft>
-              <a:buClr>
-                <a:srgbClr val="3F3F3F"/>
-              </a:buClr>
-              <a:buSzPts val="3600"/>
-              <a:buFont typeface="Calibri"/>
-              <a:buNone/>
-            </a:pPr>
-            <a:r>
-              <a:rPr b="0" i="0" lang="es" sz="2000" u="none" cap="none" strike="noStrike">
-                <a:solidFill>
-                  <a:srgbClr val="3C63AB"/>
-                </a:solidFill>
-                <a:latin typeface="Arial"/>
-                <a:ea typeface="Arial"/>
-                <a:cs typeface="Arial"/>
-                <a:sym typeface="Arial"/>
-              </a:rPr>
-              <a:t>Clase jframe</a:t>
-            </a:r>
-            <a:endParaRPr b="0" i="0" sz="2000" u="none" cap="none" strike="noStrike">
-              <a:solidFill>
-                <a:srgbClr val="3C63AB"/>
-              </a:solidFill>
-              <a:latin typeface="Arial"/>
-              <a:ea typeface="Arial"/>
-              <a:cs typeface="Arial"/>
-              <a:sym typeface="Arial"/>
-            </a:endParaRPr>
-          </a:p>
-        </p:txBody>
-      </p:sp>
-      <p:sp>
-        <p:nvSpPr>
-          <p:cNvPr id="179" name="Google Shape;179;p20"/>
-          <p:cNvSpPr txBox="1"/>
-          <p:nvPr/>
-        </p:nvSpPr>
-        <p:spPr>
-          <a:xfrm>
-            <a:off x="5958448" y="3526754"/>
-            <a:ext cx="1887300" cy="421500"/>
-          </a:xfrm>
-          <a:prstGeom prst="rect">
-            <a:avLst/>
-          </a:prstGeom>
-          <a:noFill/>
-          <a:ln>
-            <a:noFill/>
-          </a:ln>
-        </p:spPr>
-        <p:txBody>
-          <a:bodyPr anchorCtr="0" anchor="b" bIns="34275" lIns="68575" spcFirstLastPara="1" rIns="68575" wrap="square" tIns="34275">
-            <a:noAutofit/>
-          </a:bodyPr>
-          <a:lstStyle/>
-          <a:p>
-            <a:pPr indent="0" lvl="0" marL="0" marR="0" rtl="0" algn="l">
-              <a:lnSpc>
-                <a:spcPct val="85000"/>
-              </a:lnSpc>
-              <a:spcBef>
-                <a:spcPts val="0"/>
-              </a:spcBef>
-              <a:spcAft>
-                <a:spcPts val="0"/>
-              </a:spcAft>
-              <a:buClr>
-                <a:srgbClr val="3F3F3F"/>
-              </a:buClr>
-              <a:buSzPts val="3600"/>
-              <a:buFont typeface="Calibri"/>
-              <a:buNone/>
-            </a:pPr>
-            <a:r>
-              <a:rPr b="0" i="0" lang="es" sz="2000" u="none" cap="none" strike="noStrike">
-                <a:solidFill>
-                  <a:srgbClr val="3C63AB"/>
-                </a:solidFill>
-                <a:latin typeface="Arial"/>
-                <a:ea typeface="Arial"/>
-                <a:cs typeface="Arial"/>
-                <a:sym typeface="Arial"/>
-              </a:rPr>
-              <a:t>Constructor</a:t>
-            </a:r>
-            <a:endParaRPr/>
-          </a:p>
-        </p:txBody>
-      </p:sp>
     </p:spTree>
   </p:cSld>
   <p:clrMapOvr>
@@ -19495,14 +19053,12 @@
         <p:nvSpPr>
           <p:cNvPr id="184" name="Google Shape;184;p21"/>
           <p:cNvSpPr txBox="1"/>
-          <p:nvPr>
-            <p:ph type="title"/>
-          </p:nvPr>
+          <p:nvPr/>
         </p:nvSpPr>
         <p:spPr>
           <a:xfrm>
-            <a:off x="870550" y="804150"/>
-            <a:ext cx="7505700" cy="618000"/>
+            <a:off x="738925" y="904247"/>
+            <a:ext cx="7543800" cy="625500"/>
           </a:xfrm>
           <a:prstGeom prst="rect">
             <a:avLst/>
@@ -19528,52 +19084,179 @@
               <a:spcAft>
                 <a:spcPts val="0"/>
               </a:spcAft>
-              <a:buClr>
-                <a:srgbClr val="3F3F3F"/>
-              </a:buClr>
-              <a:buSzPts val="3600"/>
-              <a:buFont typeface="Calibri"/>
+              <a:buNone/>
+            </a:pPr>
+            <a:r>
+              <a:rPr lang="es" sz="2300">
+                <a:solidFill>
+                  <a:srgbClr val="E83464"/>
+                </a:solidFill>
+              </a:rPr>
+              <a:t>Código del ejemplo utilizando Scene Builder: Calculadora</a:t>
+            </a:r>
+            <a:endParaRPr sz="2000">
+              <a:solidFill>
+                <a:srgbClr val="AF7B51"/>
+              </a:solidFill>
+              <a:latin typeface="Nunito"/>
+              <a:ea typeface="Nunito"/>
+              <a:cs typeface="Nunito"/>
+              <a:sym typeface="Nunito"/>
+            </a:endParaRPr>
+          </a:p>
+        </p:txBody>
+      </p:sp>
+      <p:sp>
+        <p:nvSpPr>
+          <p:cNvPr id="185" name="Google Shape;185;p21"/>
+          <p:cNvSpPr txBox="1"/>
+          <p:nvPr/>
+        </p:nvSpPr>
+        <p:spPr>
+          <a:xfrm>
+            <a:off x="3998850" y="3732400"/>
+            <a:ext cx="4907100" cy="831300"/>
+          </a:xfrm>
+          <a:prstGeom prst="rect">
+            <a:avLst/>
+          </a:prstGeom>
+          <a:noFill/>
+          <a:ln>
+            <a:noFill/>
+          </a:ln>
+        </p:spPr>
+        <p:txBody>
+          <a:bodyPr anchorCtr="0" anchor="t" bIns="91425" lIns="91425" spcFirstLastPara="1" rIns="91425" wrap="square" tIns="91425">
+            <a:spAutoFit/>
+          </a:bodyPr>
+          <a:lstStyle/>
+          <a:p>
+            <a:pPr indent="0" lvl="0" marL="0" rtl="0" algn="l">
+              <a:spcBef>
+                <a:spcPts val="0"/>
+              </a:spcBef>
+              <a:spcAft>
+                <a:spcPts val="0"/>
+              </a:spcAft>
               <a:buNone/>
             </a:pPr>
             <a:r>
               <a:rPr lang="es">
                 <a:solidFill>
-                  <a:srgbClr val="E83464"/>
-                </a:solidFill>
-                <a:latin typeface="Arial"/>
-                <a:ea typeface="Arial"/>
-                <a:cs typeface="Arial"/>
-                <a:sym typeface="Arial"/>
+                  <a:schemeClr val="accent5"/>
+                </a:solidFill>
+                <a:latin typeface="Calibri"/>
+                <a:ea typeface="Calibri"/>
+                <a:cs typeface="Calibri"/>
+                <a:sym typeface="Calibri"/>
               </a:rPr>
-              <a:t>Código del ejemplo</a:t>
+              <a:t>Copiar el esqueleto del controlador sugerido por la herramienta en nuestro proyecto con el mismo nombre </a:t>
             </a:r>
+            <a:endParaRPr>
+              <a:solidFill>
+                <a:schemeClr val="accent5"/>
+              </a:solidFill>
+              <a:latin typeface="Calibri"/>
+              <a:ea typeface="Calibri"/>
+              <a:cs typeface="Calibri"/>
+              <a:sym typeface="Calibri"/>
+            </a:endParaRPr>
+          </a:p>
+          <a:p>
+            <a:pPr indent="0" lvl="0" marL="0" rtl="0" algn="l">
+              <a:spcBef>
+                <a:spcPts val="0"/>
+              </a:spcBef>
+              <a:spcAft>
+                <a:spcPts val="0"/>
+              </a:spcAft>
+              <a:buNone/>
+            </a:pPr>
             <a:r>
-              <a:rPr lang="es" sz="2800">
-                <a:solidFill>
-                  <a:srgbClr val="E83464"/>
-                </a:solidFill>
-                <a:latin typeface="Arial"/>
-                <a:ea typeface="Arial"/>
-                <a:cs typeface="Arial"/>
-                <a:sym typeface="Arial"/>
+              <a:rPr lang="es">
+                <a:solidFill>
+                  <a:schemeClr val="accent5"/>
+                </a:solidFill>
+                <a:latin typeface="Calibri"/>
+                <a:ea typeface="Calibri"/>
+                <a:cs typeface="Calibri"/>
+                <a:sym typeface="Calibri"/>
               </a:rPr>
-              <a:t>: Calculadora</a:t>
+              <a:t>y extensión .java</a:t>
             </a:r>
-            <a:endParaRPr sz="2800">
+            <a:endParaRPr>
               <a:solidFill>
-                <a:srgbClr val="E83464"/>
+                <a:schemeClr val="accent5"/>
               </a:solidFill>
-              <a:latin typeface="Arial"/>
-              <a:ea typeface="Arial"/>
-              <a:cs typeface="Arial"/>
-              <a:sym typeface="Arial"/>
+              <a:latin typeface="Calibri"/>
+              <a:ea typeface="Calibri"/>
+              <a:cs typeface="Calibri"/>
+              <a:sym typeface="Calibri"/>
+            </a:endParaRPr>
+          </a:p>
+        </p:txBody>
+      </p:sp>
+      <p:sp>
+        <p:nvSpPr>
+          <p:cNvPr id="186" name="Google Shape;186;p21"/>
+          <p:cNvSpPr txBox="1"/>
+          <p:nvPr/>
+        </p:nvSpPr>
+        <p:spPr>
+          <a:xfrm>
+            <a:off x="529600" y="1529750"/>
+            <a:ext cx="3542100" cy="615600"/>
+          </a:xfrm>
+          <a:prstGeom prst="rect">
+            <a:avLst/>
+          </a:prstGeom>
+          <a:noFill/>
+          <a:ln>
+            <a:noFill/>
+          </a:ln>
+        </p:spPr>
+        <p:txBody>
+          <a:bodyPr anchorCtr="0" anchor="t" bIns="91425" lIns="91425" spcFirstLastPara="1" rIns="91425" wrap="square" tIns="91425">
+            <a:spAutoFit/>
+          </a:bodyPr>
+          <a:lstStyle/>
+          <a:p>
+            <a:pPr indent="0" lvl="0" marL="0" rtl="0" algn="l">
+              <a:spcBef>
+                <a:spcPts val="0"/>
+              </a:spcBef>
+              <a:spcAft>
+                <a:spcPts val="0"/>
+              </a:spcAft>
+              <a:buNone/>
+            </a:pPr>
+            <a:r>
+              <a:rPr lang="es">
+                <a:solidFill>
+                  <a:schemeClr val="accent5"/>
+                </a:solidFill>
+                <a:latin typeface="Calibri"/>
+                <a:ea typeface="Calibri"/>
+                <a:cs typeface="Calibri"/>
+                <a:sym typeface="Calibri"/>
+              </a:rPr>
+              <a:t>Guardar archivo FXML en la carpeta src de nuestro proyecto en visual studio code</a:t>
+            </a:r>
+            <a:endParaRPr>
+              <a:solidFill>
+                <a:schemeClr val="accent5"/>
+              </a:solidFill>
+              <a:latin typeface="Calibri"/>
+              <a:ea typeface="Calibri"/>
+              <a:cs typeface="Calibri"/>
+              <a:sym typeface="Calibri"/>
             </a:endParaRPr>
           </a:p>
         </p:txBody>
       </p:sp>
       <p:pic>
         <p:nvPicPr>
-          <p:cNvPr id="185" name="Google Shape;185;p21"/>
+          <p:cNvPr id="187" name="Google Shape;187;p21"/>
           <p:cNvPicPr preferRelativeResize="0"/>
           <p:nvPr/>
         </p:nvPicPr>
@@ -19587,8 +19270,8 @@
         </p:blipFill>
         <p:spPr>
           <a:xfrm>
-            <a:off x="303675" y="2159500"/>
-            <a:ext cx="7372350" cy="1924050"/>
+            <a:off x="781050" y="2187750"/>
+            <a:ext cx="2609850" cy="2422350"/>
           </a:xfrm>
           <a:prstGeom prst="rect">
             <a:avLst/>
@@ -19599,16 +19282,24 @@
           </a:ln>
         </p:spPr>
       </p:pic>
-      <p:sp>
-        <p:nvSpPr>
-          <p:cNvPr id="186" name="Google Shape;186;p21"/>
-          <p:cNvSpPr txBox="1"/>
+      <p:pic>
+        <p:nvPicPr>
+          <p:cNvPr id="188" name="Google Shape;188;p21"/>
+          <p:cNvPicPr preferRelativeResize="0"/>
           <p:nvPr/>
-        </p:nvSpPr>
+        </p:nvPicPr>
+        <p:blipFill>
+          <a:blip r:embed="rId5">
+            <a:alphaModFix/>
+          </a:blip>
+          <a:stretch>
+            <a:fillRect/>
+          </a:stretch>
+        </p:blipFill>
         <p:spPr>
           <a:xfrm>
-            <a:off x="303674" y="1650650"/>
-            <a:ext cx="4494600" cy="421500"/>
+            <a:off x="4646113" y="1310050"/>
+            <a:ext cx="2549672" cy="2422350"/>
           </a:xfrm>
           <a:prstGeom prst="rect">
             <a:avLst/>
@@ -19618,49 +19309,7 @@
             <a:noFill/>
           </a:ln>
         </p:spPr>
-        <p:txBody>
-          <a:bodyPr anchorCtr="0" anchor="b" bIns="34275" lIns="68575" spcFirstLastPara="1" rIns="68575" wrap="square" tIns="34275">
-            <a:noAutofit/>
-          </a:bodyPr>
-          <a:lstStyle/>
-          <a:p>
-            <a:pPr indent="0" lvl="0" marL="0" marR="0" rtl="0" algn="l">
-              <a:lnSpc>
-                <a:spcPct val="85000"/>
-              </a:lnSpc>
-              <a:spcBef>
-                <a:spcPts val="0"/>
-              </a:spcBef>
-              <a:spcAft>
-                <a:spcPts val="0"/>
-              </a:spcAft>
-              <a:buClr>
-                <a:srgbClr val="3F3F3F"/>
-              </a:buClr>
-              <a:buSzPts val="3600"/>
-              <a:buFont typeface="Calibri"/>
-              <a:buNone/>
-            </a:pPr>
-            <a:r>
-              <a:rPr lang="es" sz="2000">
-                <a:solidFill>
-                  <a:srgbClr val="3C63AB"/>
-                </a:solidFill>
-              </a:rPr>
-              <a:t>Declaración de componentes a utilizar</a:t>
-            </a:r>
-            <a:endParaRPr b="0" i="0" sz="2000" u="none" cap="none" strike="noStrike">
-              <a:solidFill>
-                <a:srgbClr val="3C63AB"/>
-              </a:solidFill>
-              <a:latin typeface="Arial"/>
-              <a:ea typeface="Arial"/>
-              <a:cs typeface="Arial"/>
-              <a:sym typeface="Arial"/>
-            </a:endParaRPr>
-          </a:p>
-        </p:txBody>
-      </p:sp>
+      </p:pic>
     </p:spTree>
   </p:cSld>
   <p:clrMapOvr>
@@ -19686,7 +19335,7 @@
     </p:bg>
     <p:spTree>
       <p:nvGrpSpPr>
-        <p:cNvPr id="190" name="Shape 190"/>
+        <p:cNvPr id="192" name="Shape 192"/>
         <p:cNvGrpSpPr/>
         <p:nvPr/>
       </p:nvGrpSpPr>
@@ -19700,7 +19349,7 @@
       </p:grpSpPr>
       <p:sp>
         <p:nvSpPr>
-          <p:cNvPr id="191" name="Google Shape;191;p22"/>
+          <p:cNvPr id="193" name="Google Shape;193;p22"/>
           <p:cNvSpPr txBox="1"/>
           <p:nvPr>
             <p:ph type="title"/>
@@ -19708,7 +19357,7 @@
         </p:nvSpPr>
         <p:spPr>
           <a:xfrm>
-            <a:off x="870550" y="804150"/>
+            <a:off x="965650" y="1201800"/>
             <a:ext cx="7505700" cy="618000"/>
           </a:xfrm>
           <a:prstGeom prst="rect">
@@ -19743,7 +19392,7 @@
               <a:buNone/>
             </a:pPr>
             <a:r>
-              <a:rPr lang="es">
+              <a:rPr lang="es" sz="2800">
                 <a:solidFill>
                   <a:srgbClr val="E83464"/>
                 </a:solidFill>
@@ -19752,10 +19401,10 @@
                 <a:cs typeface="Arial"/>
                 <a:sym typeface="Arial"/>
               </a:rPr>
-              <a:t>Código del ejemplo</a:t>
+              <a:t>Código del ejemplo utilizando Scene Builder</a:t>
             </a:r>
             <a:r>
-              <a:rPr lang="es" sz="2800">
+              <a:rPr lang="es" sz="2600">
                 <a:solidFill>
                   <a:srgbClr val="E83464"/>
                 </a:solidFill>
@@ -19766,7 +19415,7 @@
               </a:rPr>
               <a:t>: Calculadora</a:t>
             </a:r>
-            <a:endParaRPr sz="2800">
+            <a:endParaRPr sz="2600">
               <a:solidFill>
                 <a:srgbClr val="E83464"/>
               </a:solidFill>
@@ -19780,14 +19429,14 @@
       </p:sp>
       <p:sp>
         <p:nvSpPr>
-          <p:cNvPr id="192" name="Google Shape;192;p22"/>
+          <p:cNvPr id="194" name="Google Shape;194;p22"/>
           <p:cNvSpPr txBox="1"/>
           <p:nvPr/>
         </p:nvSpPr>
         <p:spPr>
           <a:xfrm>
-            <a:off x="5880850" y="2225525"/>
-            <a:ext cx="1963200" cy="1030200"/>
+            <a:off x="6227750" y="2357875"/>
+            <a:ext cx="2020800" cy="831300"/>
           </a:xfrm>
           <a:prstGeom prst="rect">
             <a:avLst/>
@@ -19798,51 +19447,47 @@
           </a:ln>
         </p:spPr>
         <p:txBody>
-          <a:bodyPr anchorCtr="0" anchor="b" bIns="34275" lIns="68575" spcFirstLastPara="1" rIns="68575" wrap="square" tIns="34275">
-            <a:noAutofit/>
+          <a:bodyPr anchorCtr="0" anchor="t" bIns="91425" lIns="91425" spcFirstLastPara="1" rIns="91425" wrap="square" tIns="91425">
+            <a:spAutoFit/>
           </a:bodyPr>
           <a:lstStyle/>
           <a:p>
-            <a:pPr indent="0" lvl="0" marL="0" marR="0" rtl="0" algn="l">
-              <a:lnSpc>
-                <a:spcPct val="85000"/>
-              </a:lnSpc>
-              <a:spcBef>
-                <a:spcPts val="0"/>
-              </a:spcBef>
-              <a:spcAft>
-                <a:spcPts val="0"/>
-              </a:spcAft>
-              <a:buClr>
-                <a:srgbClr val="3F3F3F"/>
-              </a:buClr>
-              <a:buSzPts val="3600"/>
-              <a:buFont typeface="Calibri"/>
+            <a:pPr indent="0" lvl="0" marL="0" rtl="0" algn="l">
+              <a:spcBef>
+                <a:spcPts val="0"/>
+              </a:spcBef>
+              <a:spcAft>
+                <a:spcPts val="0"/>
+              </a:spcAft>
               <a:buNone/>
             </a:pPr>
             <a:r>
-              <a:rPr lang="es" sz="2000">
-                <a:solidFill>
-                  <a:srgbClr val="3C63AB"/>
-                </a:solidFill>
+              <a:rPr lang="es">
+                <a:solidFill>
+                  <a:srgbClr val="3D4594"/>
+                </a:solidFill>
+                <a:latin typeface="Calibri"/>
+                <a:ea typeface="Calibri"/>
+                <a:cs typeface="Calibri"/>
+                <a:sym typeface="Calibri"/>
               </a:rPr>
-              <a:t>Declaración de variables a utilizar</a:t>
+              <a:t>En la clase principal App se define el archivo fxml que se va a mostrar</a:t>
             </a:r>
-            <a:endParaRPr b="0" i="0" sz="2000" u="none" cap="none" strike="noStrike">
+            <a:endParaRPr>
               <a:solidFill>
-                <a:srgbClr val="3C63AB"/>
+                <a:srgbClr val="3D4594"/>
               </a:solidFill>
-              <a:latin typeface="Arial"/>
-              <a:ea typeface="Arial"/>
-              <a:cs typeface="Arial"/>
-              <a:sym typeface="Arial"/>
+              <a:latin typeface="Calibri"/>
+              <a:ea typeface="Calibri"/>
+              <a:cs typeface="Calibri"/>
+              <a:sym typeface="Calibri"/>
             </a:endParaRPr>
           </a:p>
         </p:txBody>
       </p:sp>
       <p:pic>
         <p:nvPicPr>
-          <p:cNvPr id="193" name="Google Shape;193;p22"/>
+          <p:cNvPr id="195" name="Google Shape;195;p22"/>
           <p:cNvPicPr preferRelativeResize="0"/>
           <p:nvPr/>
         </p:nvPicPr>
@@ -19856,8 +19501,8 @@
         </p:blipFill>
         <p:spPr>
           <a:xfrm>
-            <a:off x="456900" y="1517450"/>
-            <a:ext cx="4992350" cy="3331800"/>
+            <a:off x="723900" y="1876950"/>
+            <a:ext cx="4879712" cy="3018900"/>
           </a:xfrm>
           <a:prstGeom prst="rect">
             <a:avLst/>
@@ -19893,7 +19538,7 @@
     </p:bg>
     <p:spTree>
       <p:nvGrpSpPr>
-        <p:cNvPr id="197" name="Shape 197"/>
+        <p:cNvPr id="199" name="Shape 199"/>
         <p:cNvGrpSpPr/>
         <p:nvPr/>
       </p:nvGrpSpPr>
@@ -19907,7 +19552,7 @@
       </p:grpSpPr>
       <p:sp>
         <p:nvSpPr>
-          <p:cNvPr id="198" name="Google Shape;198;p23"/>
+          <p:cNvPr id="200" name="Google Shape;200;p23"/>
           <p:cNvSpPr txBox="1"/>
           <p:nvPr>
             <p:ph type="title"/>
@@ -19915,7 +19560,7 @@
         </p:nvSpPr>
         <p:spPr>
           <a:xfrm>
-            <a:off x="870550" y="804150"/>
+            <a:off x="965800" y="1055625"/>
             <a:ext cx="7505700" cy="618000"/>
           </a:xfrm>
           <a:prstGeom prst="rect">
@@ -19950,7 +19595,7 @@
               <a:buNone/>
             </a:pPr>
             <a:r>
-              <a:rPr lang="es">
+              <a:rPr lang="es" sz="2800">
                 <a:solidFill>
                   <a:srgbClr val="E83464"/>
                 </a:solidFill>
@@ -19959,10 +19604,10 @@
                 <a:cs typeface="Arial"/>
                 <a:sym typeface="Arial"/>
               </a:rPr>
-              <a:t>Código del ejemplo</a:t>
+              <a:t>Código del ejemplo utilizando Scene Builder</a:t>
             </a:r>
             <a:r>
-              <a:rPr lang="es" sz="2800">
+              <a:rPr lang="es" sz="2600">
                 <a:solidFill>
                   <a:srgbClr val="E83464"/>
                 </a:solidFill>
@@ -19985,9 +19630,71 @@
           </a:p>
         </p:txBody>
       </p:sp>
+      <p:sp>
+        <p:nvSpPr>
+          <p:cNvPr id="201" name="Google Shape;201;p23"/>
+          <p:cNvSpPr txBox="1"/>
+          <p:nvPr/>
+        </p:nvSpPr>
+        <p:spPr>
+          <a:xfrm>
+            <a:off x="4067175" y="2106125"/>
+            <a:ext cx="3448200" cy="384300"/>
+          </a:xfrm>
+          <a:prstGeom prst="rect">
+            <a:avLst/>
+          </a:prstGeom>
+          <a:noFill/>
+          <a:ln>
+            <a:noFill/>
+          </a:ln>
+        </p:spPr>
+        <p:txBody>
+          <a:bodyPr anchorCtr="0" anchor="b" bIns="34275" lIns="68575" spcFirstLastPara="1" rIns="68575" wrap="square" tIns="34275">
+            <a:noAutofit/>
+          </a:bodyPr>
+          <a:lstStyle/>
+          <a:p>
+            <a:pPr indent="0" lvl="0" marL="0" marR="0" rtl="0" algn="l">
+              <a:lnSpc>
+                <a:spcPct val="85000"/>
+              </a:lnSpc>
+              <a:spcBef>
+                <a:spcPts val="0"/>
+              </a:spcBef>
+              <a:spcAft>
+                <a:spcPts val="0"/>
+              </a:spcAft>
+              <a:buClr>
+                <a:srgbClr val="3F3F3F"/>
+              </a:buClr>
+              <a:buSzPts val="3600"/>
+              <a:buFont typeface="Calibri"/>
+              <a:buNone/>
+            </a:pPr>
+            <a:r>
+              <a:rPr lang="es" sz="1600">
+                <a:solidFill>
+                  <a:srgbClr val="3C63AB"/>
+                </a:solidFill>
+              </a:rPr>
+              <a:t>Declaración de variables a utilizar</a:t>
+            </a:r>
+            <a:endParaRPr b="0" i="0" sz="1600" u="none" cap="none" strike="noStrike">
+              <a:solidFill>
+                <a:srgbClr val="3C63AB"/>
+              </a:solidFill>
+              <a:latin typeface="Arial"/>
+              <a:ea typeface="Arial"/>
+              <a:cs typeface="Arial"/>
+              <a:sym typeface="Arial"/>
+            </a:endParaRPr>
+          </a:p>
+        </p:txBody>
+      </p:sp>
       <p:pic>
         <p:nvPicPr>
-          <p:cNvPr id="199" name="Google Shape;199;p23"/>
+          <p:cNvPr id="202" name="Google Shape;202;p23"/>
           <p:cNvPicPr preferRelativeResize="0"/>
           <p:nvPr/>
         </p:nvPicPr>
@@ -20001,8 +19708,8 @@
         </p:blipFill>
         <p:spPr>
           <a:xfrm>
-            <a:off x="384350" y="1523000"/>
-            <a:ext cx="4620825" cy="3094300"/>
+            <a:off x="1267375" y="2106125"/>
+            <a:ext cx="2657435" cy="618000"/>
           </a:xfrm>
           <a:prstGeom prst="rect">
             <a:avLst/>
@@ -20013,9 +19720,67 @@
           </a:ln>
         </p:spPr>
       </p:pic>
+      <p:sp>
+        <p:nvSpPr>
+          <p:cNvPr id="203" name="Google Shape;203;p23"/>
+          <p:cNvSpPr txBox="1"/>
+          <p:nvPr/>
+        </p:nvSpPr>
+        <p:spPr>
+          <a:xfrm>
+            <a:off x="1009650" y="1658250"/>
+            <a:ext cx="3448200" cy="384300"/>
+          </a:xfrm>
+          <a:prstGeom prst="rect">
+            <a:avLst/>
+          </a:prstGeom>
+          <a:noFill/>
+          <a:ln>
+            <a:noFill/>
+          </a:ln>
+        </p:spPr>
+        <p:txBody>
+          <a:bodyPr anchorCtr="0" anchor="b" bIns="34275" lIns="68575" spcFirstLastPara="1" rIns="68575" wrap="square" tIns="34275">
+            <a:noAutofit/>
+          </a:bodyPr>
+          <a:lstStyle/>
+          <a:p>
+            <a:pPr indent="0" lvl="0" marL="0" marR="0" rtl="0" algn="l">
+              <a:lnSpc>
+                <a:spcPct val="85000"/>
+              </a:lnSpc>
+              <a:spcBef>
+                <a:spcPts val="0"/>
+              </a:spcBef>
+              <a:spcAft>
+                <a:spcPts val="0"/>
+              </a:spcAft>
+              <a:buClr>
+                <a:srgbClr val="3F3F3F"/>
+              </a:buClr>
+              <a:buSzPts val="3600"/>
+              <a:buFont typeface="Calibri"/>
+              <a:buNone/>
+            </a:pPr>
+            <a:r>
+              <a:rPr b="1" lang="es" sz="1500">
+                <a:solidFill>
+                  <a:srgbClr val="3C63AB"/>
+                </a:solidFill>
+              </a:rPr>
+              <a:t>Archivo controlador</a:t>
+            </a:r>
+            <a:endParaRPr b="1" i="0" sz="1500" u="none" cap="none" strike="noStrike">
+              <a:solidFill>
+                <a:srgbClr val="3C63AB"/>
+              </a:solidFill>
+            </a:endParaRPr>
+          </a:p>
+        </p:txBody>
+      </p:sp>
       <p:pic>
         <p:nvPicPr>
-          <p:cNvPr id="200" name="Google Shape;200;p23"/>
+          <p:cNvPr id="204" name="Google Shape;204;p23"/>
           <p:cNvPicPr preferRelativeResize="0"/>
           <p:nvPr/>
         </p:nvPicPr>
@@ -20029,8 +19794,114 @@
         </p:blipFill>
         <p:spPr>
           <a:xfrm>
-            <a:off x="5157575" y="1574550"/>
-            <a:ext cx="3781425" cy="2419350"/>
+            <a:off x="1354500" y="2922912"/>
+            <a:ext cx="2984199" cy="1390475"/>
+          </a:xfrm>
+          <a:prstGeom prst="rect">
+            <a:avLst/>
+          </a:prstGeom>
+          <a:noFill/>
+          <a:ln>
+            <a:noFill/>
+          </a:ln>
+        </p:spPr>
+      </p:pic>
+      <p:sp>
+        <p:nvSpPr>
+          <p:cNvPr id="205" name="Google Shape;205;p23"/>
+          <p:cNvSpPr txBox="1"/>
+          <p:nvPr/>
+        </p:nvSpPr>
+        <p:spPr>
+          <a:xfrm>
+            <a:off x="1216325" y="4454375"/>
+            <a:ext cx="5108400" cy="517800"/>
+          </a:xfrm>
+          <a:prstGeom prst="rect">
+            <a:avLst/>
+          </a:prstGeom>
+          <a:noFill/>
+          <a:ln>
+            <a:noFill/>
+          </a:ln>
+        </p:spPr>
+        <p:txBody>
+          <a:bodyPr anchorCtr="0" anchor="b" bIns="34275" lIns="68575" spcFirstLastPara="1" rIns="68575" wrap="square" tIns="34275">
+            <a:noAutofit/>
+          </a:bodyPr>
+          <a:lstStyle/>
+          <a:p>
+            <a:pPr indent="0" lvl="0" marL="0" marR="0" rtl="0" algn="l">
+              <a:lnSpc>
+                <a:spcPct val="85000"/>
+              </a:lnSpc>
+              <a:spcBef>
+                <a:spcPts val="0"/>
+              </a:spcBef>
+              <a:spcAft>
+                <a:spcPts val="0"/>
+              </a:spcAft>
+              <a:buClr>
+                <a:srgbClr val="3F3F3F"/>
+              </a:buClr>
+              <a:buSzPts val="3600"/>
+              <a:buFont typeface="Calibri"/>
+              <a:buNone/>
+            </a:pPr>
+            <a:r>
+              <a:rPr lang="es" sz="1600">
+                <a:solidFill>
+                  <a:srgbClr val="3C63AB"/>
+                </a:solidFill>
+              </a:rPr>
+              <a:t>Añadir </a:t>
+            </a:r>
+            <a:r>
+              <a:rPr lang="es" sz="1600">
+                <a:solidFill>
+                  <a:srgbClr val="3C63AB"/>
+                </a:solidFill>
+              </a:rPr>
+              <a:t>numeros</a:t>
+            </a:r>
+            <a:r>
+              <a:rPr lang="es" sz="1600">
+                <a:solidFill>
+                  <a:srgbClr val="3C63AB"/>
+                </a:solidFill>
+              </a:rPr>
+              <a:t> y mostrar en pantalla pantalla (ejemplo con el botón del número 1)</a:t>
+            </a:r>
+            <a:endParaRPr b="0" i="0" sz="1600" u="none" cap="none" strike="noStrike">
+              <a:solidFill>
+                <a:srgbClr val="3C63AB"/>
+              </a:solidFill>
+              <a:latin typeface="Arial"/>
+              <a:ea typeface="Arial"/>
+              <a:cs typeface="Arial"/>
+              <a:sym typeface="Arial"/>
+            </a:endParaRPr>
+          </a:p>
+        </p:txBody>
+      </p:sp>
+      <p:pic>
+        <p:nvPicPr>
+          <p:cNvPr id="206" name="Google Shape;206;p23"/>
+          <p:cNvPicPr preferRelativeResize="0"/>
+          <p:nvPr/>
+        </p:nvPicPr>
+        <p:blipFill>
+          <a:blip r:embed="rId6">
+            <a:alphaModFix/>
+          </a:blip>
+          <a:stretch>
+            <a:fillRect/>
+          </a:stretch>
+        </p:blipFill>
+        <p:spPr>
+          <a:xfrm>
+            <a:off x="4962650" y="2805550"/>
+            <a:ext cx="1771525" cy="1548350"/>
           </a:xfrm>
           <a:prstGeom prst="rect">
             <a:avLst/>
@@ -20050,6 +19921,285 @@
 </file>
 
 <file path=ppt/theme/theme1.xml><?xml version="1.0" encoding="utf-8"?>
+<a:theme xmlns:a="http://schemas.openxmlformats.org/drawingml/2006/main" xmlns:r="http://schemas.openxmlformats.org/officeDocument/2006/relationships" name="Shift">
+  <a:themeElements>
+    <a:clrScheme name="Shift">
+      <a:dk1>
+        <a:srgbClr val="FFFFFF"/>
+      </a:dk1>
+      <a:lt1>
+        <a:srgbClr val="AF7B51"/>
+      </a:lt1>
+      <a:dk2>
+        <a:srgbClr val="233A44"/>
+      </a:dk2>
+      <a:lt2>
+        <a:srgbClr val="D9D9D9"/>
+      </a:lt2>
+      <a:accent1>
+        <a:srgbClr val="00796B"/>
+      </a:accent1>
+      <a:accent2>
+        <a:srgbClr val="D9563F"/>
+      </a:accent2>
+      <a:accent3>
+        <a:srgbClr val="C4A15A"/>
+      </a:accent3>
+      <a:accent4>
+        <a:srgbClr val="14F597"/>
+      </a:accent4>
+      <a:accent5>
+        <a:srgbClr val="3D4594"/>
+      </a:accent5>
+      <a:accent6>
+        <a:srgbClr val="163EF5"/>
+      </a:accent6>
+      <a:hlink>
+        <a:srgbClr val="3D4594"/>
+      </a:hlink>
+      <a:folHlink>
+        <a:srgbClr val="3D4594"/>
+      </a:folHlink>
+    </a:clrScheme>
+    <a:fontScheme name="Office">
+      <a:majorFont>
+        <a:latin typeface="Arial"/>
+        <a:ea typeface=""/>
+        <a:cs typeface=""/>
+        <a:font script="Jpan" typeface="ＭＳ Ｐゴシック"/>
+        <a:font script="Hang" typeface="맑은 고딕"/>
+        <a:font script="Hans" typeface="宋体"/>
+        <a:font script="Hant" typeface="新細明體"/>
+        <a:font script="Arab" typeface="Times New Roman"/>
+        <a:font script="Hebr" typeface="Times New Roman"/>
+        <a:font script="Thai" typeface="Angsana New"/>
+        <a:font script="Ethi" typeface="Nyala"/>
+        <a:font script="Beng" typeface="Vrinda"/>
+        <a:font script="Gujr" typeface="Shruti"/>
+        <a:font script="Khmr" typeface="MoolBoran"/>
+        <a:font script="Knda" typeface="Tunga"/>
+        <a:font script="Guru" typeface="Raavi"/>
+        <a:font script="Cans" typeface="Euphemia"/>
+        <a:font script="Cher" typeface="Plantagenet Cherokee"/>
+        <a:font script="Yiii" typeface="Microsoft Yi Baiti"/>
+        <a:font script="Tibt" typeface="Microsoft Himalaya"/>
+        <a:font script="Thaa" typeface="MV Boli"/>
+        <a:font script="Deva" typeface="Mangal"/>
+        <a:font script="Telu" typeface="Gautami"/>
+        <a:font script="Taml" typeface="Latha"/>
+        <a:font script="Syrc" typeface="Estrangelo Edessa"/>
+        <a:font script="Orya" typeface="Kalinga"/>
+        <a:font script="Mlym" typeface="Kartika"/>
+        <a:font script="Laoo" typeface="DokChampa"/>
+        <a:font script="Sinh" typeface="Iskoola Pota"/>
+        <a:font script="Mong" typeface="Mongolian Baiti"/>
+        <a:font script="Viet" typeface="Times New Roman"/>
+        <a:font script="Uigh" typeface="Microsoft Uighur"/>
+        <a:font script="Geor" typeface="Sylfaen"/>
+      </a:majorFont>
+      <a:minorFont>
+        <a:latin typeface="Arial"/>
+        <a:ea typeface=""/>
+        <a:cs typeface=""/>
+        <a:font script="Jpan" typeface="ＭＳ Ｐゴシック"/>
+        <a:font script="Hang" typeface="맑은 고딕"/>
+        <a:font script="Hans" typeface="宋体"/>
+        <a:font script="Hant" typeface="新細明體"/>
+        <a:font script="Arab" typeface="Arial"/>
+        <a:font script="Hebr" typeface="Arial"/>
+        <a:font script="Thai" typeface="Cordia New"/>
+        <a:font script="Ethi" typeface="Nyala"/>
+        <a:font script="Beng" typeface="Vrinda"/>
+        <a:font script="Gujr" typeface="Shruti"/>
+        <a:font script="Khmr" typeface="DaunPenh"/>
+        <a:font script="Knda" typeface="Tunga"/>
+        <a:font script="Guru" typeface="Raavi"/>
+        <a:font script="Cans" typeface="Euphemia"/>
+        <a:font script="Cher" typeface="Plantagenet Cherokee"/>
+        <a:font script="Yiii" typeface="Microsoft Yi Baiti"/>
+        <a:font script="Tibt" typeface="Microsoft Himalaya"/>
+        <a:font script="Thaa" typeface="MV Boli"/>
+        <a:font script="Deva" typeface="Mangal"/>
+        <a:font script="Telu" typeface="Gautami"/>
+        <a:font script="Taml" typeface="Latha"/>
+        <a:font script="Syrc" typeface="Estrangelo Edessa"/>
+        <a:font script="Orya" typeface="Kalinga"/>
+        <a:font script="Mlym" typeface="Kartika"/>
+        <a:font script="Laoo" typeface="DokChampa"/>
+        <a:font script="Sinh" typeface="Iskoola Pota"/>
+        <a:font script="Mong" typeface="Mongolian Baiti"/>
+        <a:font script="Viet" typeface="Arial"/>
+        <a:font script="Uigh" typeface="Microsoft Uighur"/>
+        <a:font script="Geor" typeface="Sylfaen"/>
+      </a:minorFont>
+    </a:fontScheme>
+    <a:fmtScheme name="Office">
+      <a:fillStyleLst>
+        <a:solidFill>
+          <a:schemeClr val="phClr"/>
+        </a:solidFill>
+        <a:gradFill rotWithShape="1">
+          <a:gsLst>
+            <a:gs pos="0">
+              <a:schemeClr val="phClr">
+                <a:tint val="50000"/>
+                <a:satMod val="300000"/>
+              </a:schemeClr>
+            </a:gs>
+            <a:gs pos="35000">
+              <a:schemeClr val="phClr">
+                <a:tint val="37000"/>
+                <a:satMod val="300000"/>
+              </a:schemeClr>
+            </a:gs>
+            <a:gs pos="100000">
+              <a:schemeClr val="phClr">
+                <a:tint val="15000"/>
+                <a:satMod val="350000"/>
+              </a:schemeClr>
+            </a:gs>
+          </a:gsLst>
+          <a:lin ang="16200000" scaled="1"/>
+        </a:gradFill>
+        <a:gradFill rotWithShape="1">
+          <a:gsLst>
+            <a:gs pos="0">
+              <a:schemeClr val="phClr">
+                <a:tint val="100000"/>
+                <a:shade val="100000"/>
+                <a:satMod val="130000"/>
+              </a:schemeClr>
+            </a:gs>
+            <a:gs pos="100000">
+              <a:schemeClr val="phClr">
+                <a:tint val="50000"/>
+                <a:shade val="100000"/>
+                <a:satMod val="350000"/>
+              </a:schemeClr>
+            </a:gs>
+          </a:gsLst>
+          <a:lin ang="16200000" scaled="0"/>
+        </a:gradFill>
+      </a:fillStyleLst>
+      <a:lnStyleLst>
+        <a:ln w="9525" cap="flat" cmpd="sng" algn="ctr">
+          <a:solidFill>
+            <a:schemeClr val="phClr">
+              <a:shade val="95000"/>
+              <a:satMod val="105000"/>
+            </a:schemeClr>
+          </a:solidFill>
+          <a:prstDash val="solid"/>
+        </a:ln>
+        <a:ln w="25400" cap="flat" cmpd="sng" algn="ctr">
+          <a:solidFill>
+            <a:schemeClr val="phClr"/>
+          </a:solidFill>
+          <a:prstDash val="solid"/>
+        </a:ln>
+        <a:ln w="38100" cap="flat" cmpd="sng" algn="ctr">
+          <a:solidFill>
+            <a:schemeClr val="phClr"/>
+          </a:solidFill>
+          <a:prstDash val="solid"/>
+        </a:ln>
+      </a:lnStyleLst>
+      <a:effectStyleLst>
+        <a:effectStyle>
+          <a:effectLst>
+            <a:outerShdw blurRad="40000" dist="20000" dir="5400000" rotWithShape="0">
+              <a:srgbClr val="000000">
+                <a:alpha val="38000"/>
+              </a:srgbClr>
+            </a:outerShdw>
+          </a:effectLst>
+        </a:effectStyle>
+        <a:effectStyle>
+          <a:effectLst>
+            <a:outerShdw blurRad="40000" dist="23000" dir="5400000" rotWithShape="0">
+              <a:srgbClr val="000000">
+                <a:alpha val="35000"/>
+              </a:srgbClr>
+            </a:outerShdw>
+          </a:effectLst>
+        </a:effectStyle>
+        <a:effectStyle>
+          <a:effectLst>
+            <a:outerShdw blurRad="40000" dist="23000" dir="5400000" rotWithShape="0">
+              <a:srgbClr val="000000">
+                <a:alpha val="35000"/>
+              </a:srgbClr>
+            </a:outerShdw>
+          </a:effectLst>
+          <a:scene3d>
+            <a:camera prst="orthographicFront">
+              <a:rot lat="0" lon="0" rev="0"/>
+            </a:camera>
+            <a:lightRig rig="threePt" dir="t">
+              <a:rot lat="0" lon="0" rev="1200000"/>
+            </a:lightRig>
+          </a:scene3d>
+          <a:sp3d>
+            <a:bevelT w="63500" h="25400"/>
+          </a:sp3d>
+        </a:effectStyle>
+      </a:effectStyleLst>
+      <a:bgFillStyleLst>
+        <a:solidFill>
+          <a:schemeClr val="phClr"/>
+        </a:solidFill>
+        <a:gradFill rotWithShape="1">
+          <a:gsLst>
+            <a:gs pos="0">
+              <a:schemeClr val="phClr">
+                <a:tint val="40000"/>
+                <a:satMod val="350000"/>
+              </a:schemeClr>
+            </a:gs>
+            <a:gs pos="40000">
+              <a:schemeClr val="phClr">
+                <a:tint val="45000"/>
+                <a:shade val="99000"/>
+                <a:satMod val="350000"/>
+              </a:schemeClr>
+            </a:gs>
+            <a:gs pos="100000">
+              <a:schemeClr val="phClr">
+                <a:shade val="20000"/>
+                <a:satMod val="255000"/>
+              </a:schemeClr>
+            </a:gs>
+          </a:gsLst>
+          <a:path path="circle">
+            <a:fillToRect l="50000" t="-80000" r="50000" b="180000"/>
+          </a:path>
+        </a:gradFill>
+        <a:gradFill rotWithShape="1">
+          <a:gsLst>
+            <a:gs pos="0">
+              <a:schemeClr val="phClr">
+                <a:tint val="80000"/>
+                <a:satMod val="300000"/>
+              </a:schemeClr>
+            </a:gs>
+            <a:gs pos="100000">
+              <a:schemeClr val="phClr">
+                <a:shade val="30000"/>
+                <a:satMod val="200000"/>
+              </a:schemeClr>
+            </a:gs>
+          </a:gsLst>
+          <a:path path="circle">
+            <a:fillToRect l="50000" t="50000" r="50000" b="50000"/>
+          </a:path>
+        </a:gradFill>
+      </a:bgFillStyleLst>
+    </a:fmtScheme>
+  </a:themeElements>
+</a:theme>
+</file>
+
+<file path=ppt/theme/theme2.xml><?xml version="1.0" encoding="utf-8"?>
 <a:theme xmlns:a="http://schemas.openxmlformats.org/drawingml/2006/main" xmlns:r="http://schemas.openxmlformats.org/officeDocument/2006/relationships">
   <a:themeElements>
     <a:clrScheme name="Default">
@@ -20326,283 +20476,4 @@
     </a:fmtScheme>
   </a:themeElements>
 </a:theme>
-</file>
-
-<file path=ppt/theme/theme2.xml><?xml version="1.0" encoding="utf-8"?>
-<a:theme xmlns:a="http://schemas.openxmlformats.org/drawingml/2006/main" xmlns:r="http://schemas.openxmlformats.org/officeDocument/2006/relationships" name="Shift">
-  <a:themeElements>
-    <a:clrScheme name="Shift">
-      <a:dk1>
-        <a:srgbClr val="FFFFFF"/>
-      </a:dk1>
-      <a:lt1>
-        <a:srgbClr val="AF7B51"/>
-      </a:lt1>
-      <a:dk2>
-        <a:srgbClr val="233A44"/>
-      </a:dk2>
-      <a:lt2>
-        <a:srgbClr val="D9D9D9"/>
-      </a:lt2>
-      <a:accent1>
-        <a:srgbClr val="00796B"/>
-      </a:accent1>
-      <a:accent2>
-        <a:srgbClr val="D9563F"/>
-      </a:accent2>
-      <a:accent3>
-        <a:srgbClr val="C4A15A"/>
-      </a:accent3>
-      <a:accent4>
-        <a:srgbClr val="14F597"/>
-      </a:accent4>
-      <a:accent5>
-        <a:srgbClr val="3D4594"/>
-      </a:accent5>
-      <a:accent6>
-        <a:srgbClr val="163EF5"/>
-      </a:accent6>
-      <a:hlink>
-        <a:srgbClr val="3D4594"/>
-      </a:hlink>
-      <a:folHlink>
-        <a:srgbClr val="3D4594"/>
-      </a:folHlink>
-    </a:clrScheme>
-    <a:fontScheme name="Office">
-      <a:majorFont>
-        <a:latin typeface="Arial"/>
-        <a:ea typeface=""/>
-        <a:cs typeface=""/>
-        <a:font script="Jpan" typeface="ＭＳ Ｐゴシック"/>
-        <a:font script="Hang" typeface="맑은 고딕"/>
-        <a:font script="Hans" typeface="宋体"/>
-        <a:font script="Hant" typeface="新細明體"/>
-        <a:font script="Arab" typeface="Times New Roman"/>
-        <a:font script="Hebr" typeface="Times New Roman"/>
-        <a:font script="Thai" typeface="Angsana New"/>
-        <a:font script="Ethi" typeface="Nyala"/>
-        <a:font script="Beng" typeface="Vrinda"/>
-        <a:font script="Gujr" typeface="Shruti"/>
-        <a:font script="Khmr" typeface="MoolBoran"/>
-        <a:font script="Knda" typeface="Tunga"/>
-        <a:font script="Guru" typeface="Raavi"/>
-        <a:font script="Cans" typeface="Euphemia"/>
-        <a:font script="Cher" typeface="Plantagenet Cherokee"/>
-        <a:font script="Yiii" typeface="Microsoft Yi Baiti"/>
-        <a:font script="Tibt" typeface="Microsoft Himalaya"/>
-        <a:font script="Thaa" typeface="MV Boli"/>
-        <a:font script="Deva" typeface="Mangal"/>
-        <a:font script="Telu" typeface="Gautami"/>
-        <a:font script="Taml" typeface="Latha"/>
-        <a:font script="Syrc" typeface="Estrangelo Edessa"/>
-        <a:font script="Orya" typeface="Kalinga"/>
-        <a:font script="Mlym" typeface="Kartika"/>
-        <a:font script="Laoo" typeface="DokChampa"/>
-        <a:font script="Sinh" typeface="Iskoola Pota"/>
-        <a:font script="Mong" typeface="Mongolian Baiti"/>
-        <a:font script="Viet" typeface="Times New Roman"/>
-        <a:font script="Uigh" typeface="Microsoft Uighur"/>
-        <a:font script="Geor" typeface="Sylfaen"/>
-      </a:majorFont>
-      <a:minorFont>
-        <a:latin typeface="Arial"/>
-        <a:ea typeface=""/>
-        <a:cs typeface=""/>
-        <a:font script="Jpan" typeface="ＭＳ Ｐゴシック"/>
-        <a:font script="Hang" typeface="맑은 고딕"/>
-        <a:font script="Hans" typeface="宋体"/>
-        <a:font script="Hant" typeface="新細明體"/>
-        <a:font script="Arab" typeface="Arial"/>
-        <a:font script="Hebr" typeface="Arial"/>
-        <a:font script="Thai" typeface="Cordia New"/>
-        <a:font script="Ethi" typeface="Nyala"/>
-        <a:font script="Beng" typeface="Vrinda"/>
-        <a:font script="Gujr" typeface="Shruti"/>
-        <a:font script="Khmr" typeface="DaunPenh"/>
-        <a:font script="Knda" typeface="Tunga"/>
-        <a:font script="Guru" typeface="Raavi"/>
-        <a:font script="Cans" typeface="Euphemia"/>
-        <a:font script="Cher" typeface="Plantagenet Cherokee"/>
-        <a:font script="Yiii" typeface="Microsoft Yi Baiti"/>
-        <a:font script="Tibt" typeface="Microsoft Himalaya"/>
-        <a:font script="Thaa" typeface="MV Boli"/>
-        <a:font script="Deva" typeface="Mangal"/>
-        <a:font script="Telu" typeface="Gautami"/>
-        <a:font script="Taml" typeface="Latha"/>
-        <a:font script="Syrc" typeface="Estrangelo Edessa"/>
-        <a:font script="Orya" typeface="Kalinga"/>
-        <a:font script="Mlym" typeface="Kartika"/>
-        <a:font script="Laoo" typeface="DokChampa"/>
-        <a:font script="Sinh" typeface="Iskoola Pota"/>
-        <a:font script="Mong" typeface="Mongolian Baiti"/>
-        <a:font script="Viet" typeface="Arial"/>
-        <a:font script="Uigh" typeface="Microsoft Uighur"/>
-        <a:font script="Geor" typeface="Sylfaen"/>
-      </a:minorFont>
-    </a:fontScheme>
-    <a:fmtScheme name="Office">
-      <a:fillStyleLst>
-        <a:solidFill>
-          <a:schemeClr val="phClr"/>
-        </a:solidFill>
-        <a:gradFill rotWithShape="1">
-          <a:gsLst>
-            <a:gs pos="0">
-              <a:schemeClr val="phClr">
-                <a:tint val="50000"/>
-                <a:satMod val="300000"/>
-              </a:schemeClr>
-            </a:gs>
-            <a:gs pos="35000">
-              <a:schemeClr val="phClr">
-                <a:tint val="37000"/>
-                <a:satMod val="300000"/>
-              </a:schemeClr>
-            </a:gs>
-            <a:gs pos="100000">
-              <a:schemeClr val="phClr">
-                <a:tint val="15000"/>
-                <a:satMod val="350000"/>
-              </a:schemeClr>
-            </a:gs>
-          </a:gsLst>
-          <a:lin ang="16200000" scaled="1"/>
-        </a:gradFill>
-        <a:gradFill rotWithShape="1">
-          <a:gsLst>
-            <a:gs pos="0">
-              <a:schemeClr val="phClr">
-                <a:tint val="100000"/>
-                <a:shade val="100000"/>
-                <a:satMod val="130000"/>
-              </a:schemeClr>
-            </a:gs>
-            <a:gs pos="100000">
-              <a:schemeClr val="phClr">
-                <a:tint val="50000"/>
-                <a:shade val="100000"/>
-                <a:satMod val="350000"/>
-              </a:schemeClr>
-            </a:gs>
-          </a:gsLst>
-          <a:lin ang="16200000" scaled="0"/>
-        </a:gradFill>
-      </a:fillStyleLst>
-      <a:lnStyleLst>
-        <a:ln w="9525" cap="flat" cmpd="sng" algn="ctr">
-          <a:solidFill>
-            <a:schemeClr val="phClr">
-              <a:shade val="95000"/>
-              <a:satMod val="105000"/>
-            </a:schemeClr>
-          </a:solidFill>
-          <a:prstDash val="solid"/>
-        </a:ln>
-        <a:ln w="25400" cap="flat" cmpd="sng" algn="ctr">
-          <a:solidFill>
-            <a:schemeClr val="phClr"/>
-          </a:solidFill>
-          <a:prstDash val="solid"/>
-        </a:ln>
-        <a:ln w="38100" cap="flat" cmpd="sng" algn="ctr">
-          <a:solidFill>
-            <a:schemeClr val="phClr"/>
-          </a:solidFill>
-          <a:prstDash val="solid"/>
-        </a:ln>
-      </a:lnStyleLst>
-      <a:effectStyleLst>
-        <a:effectStyle>
-          <a:effectLst>
-            <a:outerShdw blurRad="40000" dist="20000" dir="5400000" rotWithShape="0">
-              <a:srgbClr val="000000">
-                <a:alpha val="38000"/>
-              </a:srgbClr>
-            </a:outerShdw>
-          </a:effectLst>
-        </a:effectStyle>
-        <a:effectStyle>
-          <a:effectLst>
-            <a:outerShdw blurRad="40000" dist="23000" dir="5400000" rotWithShape="0">
-              <a:srgbClr val="000000">
-                <a:alpha val="35000"/>
-              </a:srgbClr>
-            </a:outerShdw>
-          </a:effectLst>
-        </a:effectStyle>
-        <a:effectStyle>
-          <a:effectLst>
-            <a:outerShdw blurRad="40000" dist="23000" dir="5400000" rotWithShape="0">
-              <a:srgbClr val="000000">
-                <a:alpha val="35000"/>
-              </a:srgbClr>
-            </a:outerShdw>
-          </a:effectLst>
-          <a:scene3d>
-            <a:camera prst="orthographicFront">
-              <a:rot lat="0" lon="0" rev="0"/>
-            </a:camera>
-            <a:lightRig rig="threePt" dir="t">
-              <a:rot lat="0" lon="0" rev="1200000"/>
-            </a:lightRig>
-          </a:scene3d>
-          <a:sp3d>
-            <a:bevelT w="63500" h="25400"/>
-          </a:sp3d>
-        </a:effectStyle>
-      </a:effectStyleLst>
-      <a:bgFillStyleLst>
-        <a:solidFill>
-          <a:schemeClr val="phClr"/>
-        </a:solidFill>
-        <a:gradFill rotWithShape="1">
-          <a:gsLst>
-            <a:gs pos="0">
-              <a:schemeClr val="phClr">
-                <a:tint val="40000"/>
-                <a:satMod val="350000"/>
-              </a:schemeClr>
-            </a:gs>
-            <a:gs pos="40000">
-              <a:schemeClr val="phClr">
-                <a:tint val="45000"/>
-                <a:shade val="99000"/>
-                <a:satMod val="350000"/>
-              </a:schemeClr>
-            </a:gs>
-            <a:gs pos="100000">
-              <a:schemeClr val="phClr">
-                <a:shade val="20000"/>
-                <a:satMod val="255000"/>
-              </a:schemeClr>
-            </a:gs>
-          </a:gsLst>
-          <a:path path="circle">
-            <a:fillToRect l="50000" t="-80000" r="50000" b="180000"/>
-          </a:path>
-        </a:gradFill>
-        <a:gradFill rotWithShape="1">
-          <a:gsLst>
-            <a:gs pos="0">
-              <a:schemeClr val="phClr">
-                <a:tint val="80000"/>
-                <a:satMod val="300000"/>
-              </a:schemeClr>
-            </a:gs>
-            <a:gs pos="100000">
-              <a:schemeClr val="phClr">
-                <a:shade val="30000"/>
-                <a:satMod val="200000"/>
-              </a:schemeClr>
-            </a:gs>
-          </a:gsLst>
-          <a:path path="circle">
-            <a:fillToRect l="50000" t="50000" r="50000" b="50000"/>
-          </a:path>
-        </a:gradFill>
-      </a:bgFillStyleLst>
-    </a:fmtScheme>
-  </a:themeElements>
-</a:theme>
 </file>
</xml_diff>

<commit_message>
CT: sesión 14 actualizada
</commit_message>
<xml_diff>
--- a/Componente_Teórico_Presentaciones/Slide-Java sesión 14 semana 5_.pptx
+++ b/Componente_Teórico_Presentaciones/Slide-Java sesión 14 semana 5_.pptx
@@ -19000,8 +19000,8 @@
         </p:blipFill>
         <p:spPr>
           <a:xfrm>
-            <a:off x="5149225" y="2318273"/>
-            <a:ext cx="3605950" cy="1244825"/>
+            <a:off x="5335275" y="2318263"/>
+            <a:ext cx="3343275" cy="1419225"/>
           </a:xfrm>
           <a:prstGeom prst="rect">
             <a:avLst/>
@@ -19270,8 +19270,8 @@
         </p:blipFill>
         <p:spPr>
           <a:xfrm>
-            <a:off x="781050" y="2187750"/>
-            <a:ext cx="2609850" cy="2422350"/>
+            <a:off x="624700" y="2185375"/>
+            <a:ext cx="3013073" cy="2490700"/>
           </a:xfrm>
           <a:prstGeom prst="rect">
             <a:avLst/>
@@ -19298,8 +19298,8 @@
         </p:blipFill>
         <p:spPr>
           <a:xfrm>
-            <a:off x="4646113" y="1310050"/>
-            <a:ext cx="2549672" cy="2422350"/>
+            <a:off x="4881100" y="1352212"/>
+            <a:ext cx="2587799" cy="2439075"/>
           </a:xfrm>
           <a:prstGeom prst="rect">
             <a:avLst/>

</xml_diff>